<commit_message>
add chinese pin map
</commit_message>
<xml_diff>
--- a/img/pin_map.pptx
+++ b/img/pin_map.pptx
@@ -7,6 +7,8 @@
   <p:sldIdLst>
     <p:sldId id="256" r:id="rId2"/>
     <p:sldId id="258" r:id="rId3"/>
+    <p:sldId id="259" r:id="rId4"/>
+    <p:sldId id="260" r:id="rId5"/>
   </p:sldIdLst>
   <p:sldSz cx="12192000" cy="6858000"/>
   <p:notesSz cx="6858000" cy="9144000"/>
@@ -274,7 +276,7 @@
           <a:p>
             <a:fld id="{6BAEC7DB-416E-4648-AE31-15D6F0A9A9FB}" type="datetimeFigureOut">
               <a:rPr lang="en-US" smtClean="0"/>
-              <a:t>9/17/2018</a:t>
+              <a:t>9/27/2018</a:t>
             </a:fld>
             <a:endParaRPr lang="en-US"/>
           </a:p>
@@ -474,7 +476,7 @@
           <a:p>
             <a:fld id="{6BAEC7DB-416E-4648-AE31-15D6F0A9A9FB}" type="datetimeFigureOut">
               <a:rPr lang="en-US" smtClean="0"/>
-              <a:t>9/17/2018</a:t>
+              <a:t>9/27/2018</a:t>
             </a:fld>
             <a:endParaRPr lang="en-US"/>
           </a:p>
@@ -684,7 +686,7 @@
           <a:p>
             <a:fld id="{6BAEC7DB-416E-4648-AE31-15D6F0A9A9FB}" type="datetimeFigureOut">
               <a:rPr lang="en-US" smtClean="0"/>
-              <a:t>9/17/2018</a:t>
+              <a:t>9/27/2018</a:t>
             </a:fld>
             <a:endParaRPr lang="en-US"/>
           </a:p>
@@ -884,7 +886,7 @@
           <a:p>
             <a:fld id="{6BAEC7DB-416E-4648-AE31-15D6F0A9A9FB}" type="datetimeFigureOut">
               <a:rPr lang="en-US" smtClean="0"/>
-              <a:t>9/17/2018</a:t>
+              <a:t>9/27/2018</a:t>
             </a:fld>
             <a:endParaRPr lang="en-US"/>
           </a:p>
@@ -1160,7 +1162,7 @@
           <a:p>
             <a:fld id="{6BAEC7DB-416E-4648-AE31-15D6F0A9A9FB}" type="datetimeFigureOut">
               <a:rPr lang="en-US" smtClean="0"/>
-              <a:t>9/17/2018</a:t>
+              <a:t>9/27/2018</a:t>
             </a:fld>
             <a:endParaRPr lang="en-US"/>
           </a:p>
@@ -1428,7 +1430,7 @@
           <a:p>
             <a:fld id="{6BAEC7DB-416E-4648-AE31-15D6F0A9A9FB}" type="datetimeFigureOut">
               <a:rPr lang="en-US" smtClean="0"/>
-              <a:t>9/17/2018</a:t>
+              <a:t>9/27/2018</a:t>
             </a:fld>
             <a:endParaRPr lang="en-US"/>
           </a:p>
@@ -1843,7 +1845,7 @@
           <a:p>
             <a:fld id="{6BAEC7DB-416E-4648-AE31-15D6F0A9A9FB}" type="datetimeFigureOut">
               <a:rPr lang="en-US" smtClean="0"/>
-              <a:t>9/17/2018</a:t>
+              <a:t>9/27/2018</a:t>
             </a:fld>
             <a:endParaRPr lang="en-US"/>
           </a:p>
@@ -1985,7 +1987,7 @@
           <a:p>
             <a:fld id="{6BAEC7DB-416E-4648-AE31-15D6F0A9A9FB}" type="datetimeFigureOut">
               <a:rPr lang="en-US" smtClean="0"/>
-              <a:t>9/17/2018</a:t>
+              <a:t>9/27/2018</a:t>
             </a:fld>
             <a:endParaRPr lang="en-US"/>
           </a:p>
@@ -2098,7 +2100,7 @@
           <a:p>
             <a:fld id="{6BAEC7DB-416E-4648-AE31-15D6F0A9A9FB}" type="datetimeFigureOut">
               <a:rPr lang="en-US" smtClean="0"/>
-              <a:t>9/17/2018</a:t>
+              <a:t>9/27/2018</a:t>
             </a:fld>
             <a:endParaRPr lang="en-US"/>
           </a:p>
@@ -2411,7 +2413,7 @@
           <a:p>
             <a:fld id="{6BAEC7DB-416E-4648-AE31-15D6F0A9A9FB}" type="datetimeFigureOut">
               <a:rPr lang="en-US" smtClean="0"/>
-              <a:t>9/17/2018</a:t>
+              <a:t>9/27/2018</a:t>
             </a:fld>
             <a:endParaRPr lang="en-US"/>
           </a:p>
@@ -2700,7 +2702,7 @@
           <a:p>
             <a:fld id="{6BAEC7DB-416E-4648-AE31-15D6F0A9A9FB}" type="datetimeFigureOut">
               <a:rPr lang="en-US" smtClean="0"/>
-              <a:t>9/17/2018</a:t>
+              <a:t>9/27/2018</a:t>
             </a:fld>
             <a:endParaRPr lang="en-US"/>
           </a:p>
@@ -2943,7 +2945,7 @@
           <a:p>
             <a:fld id="{6BAEC7DB-416E-4648-AE31-15D6F0A9A9FB}" type="datetimeFigureOut">
               <a:rPr lang="en-US" smtClean="0"/>
-              <a:t>9/17/2018</a:t>
+              <a:t>9/27/2018</a:t>
             </a:fld>
             <a:endParaRPr lang="en-US"/>
           </a:p>
@@ -5744,6 +5746,2603 @@
 </p:sld>
 </file>
 
+<file path=ppt/slides/slide3.xml><?xml version="1.0" encoding="utf-8"?>
+<p:sld xmlns:a="http://schemas.openxmlformats.org/drawingml/2006/main" xmlns:r="http://schemas.openxmlformats.org/officeDocument/2006/relationships" xmlns:p="http://schemas.openxmlformats.org/presentationml/2006/main">
+  <p:cSld>
+    <p:spTree>
+      <p:nvGrpSpPr>
+        <p:cNvPr id="1" name=""/>
+        <p:cNvGrpSpPr/>
+        <p:nvPr/>
+      </p:nvGrpSpPr>
+      <p:grpSpPr>
+        <a:xfrm>
+          <a:off x="0" y="0"/>
+          <a:ext cx="0" cy="0"/>
+          <a:chOff x="0" y="0"/>
+          <a:chExt cx="0" cy="0"/>
+        </a:xfrm>
+      </p:grpSpPr>
+      <p:pic>
+        <p:nvPicPr>
+          <p:cNvPr id="4" name="图片 3">
+            <a:extLst>
+              <a:ext uri="{FF2B5EF4-FFF2-40B4-BE49-F238E27FC236}">
+                <a16:creationId xmlns:a16="http://schemas.microsoft.com/office/drawing/2014/main" id="{AEFFF965-7243-43BA-81B7-BA5B36DFCF74}"/>
+              </a:ext>
+            </a:extLst>
+          </p:cNvPr>
+          <p:cNvPicPr>
+            <a:picLocks noChangeAspect="1"/>
+          </p:cNvPicPr>
+          <p:nvPr/>
+        </p:nvPicPr>
+        <p:blipFill>
+          <a:blip r:embed="rId2">
+            <a:extLst>
+              <a:ext uri="{28A0092B-C50C-407E-A947-70E740481C1C}">
+                <a14:useLocalDpi xmlns:a14="http://schemas.microsoft.com/office/drawing/2010/main" val="0"/>
+              </a:ext>
+            </a:extLst>
+          </a:blip>
+          <a:stretch>
+            <a:fillRect/>
+          </a:stretch>
+        </p:blipFill>
+        <p:spPr>
+          <a:xfrm>
+            <a:off x="2875992" y="746070"/>
+            <a:ext cx="6585506" cy="4939130"/>
+          </a:xfrm>
+          <a:prstGeom prst="rect">
+            <a:avLst/>
+          </a:prstGeom>
+        </p:spPr>
+      </p:pic>
+      <p:cxnSp>
+        <p:nvCxnSpPr>
+          <p:cNvPr id="59" name="直接连接符 58">
+            <a:extLst>
+              <a:ext uri="{FF2B5EF4-FFF2-40B4-BE49-F238E27FC236}">
+                <a16:creationId xmlns:a16="http://schemas.microsoft.com/office/drawing/2014/main" id="{554D8D14-D48D-45F6-89A6-634C964B8AE8}"/>
+              </a:ext>
+            </a:extLst>
+          </p:cNvPr>
+          <p:cNvCxnSpPr>
+            <a:cxnSpLocks/>
+          </p:cNvCxnSpPr>
+          <p:nvPr/>
+        </p:nvCxnSpPr>
+        <p:spPr>
+          <a:xfrm>
+            <a:off x="3389027" y="2802861"/>
+            <a:ext cx="692899" cy="0"/>
+          </a:xfrm>
+          <a:prstGeom prst="line">
+            <a:avLst/>
+          </a:prstGeom>
+          <a:ln w="9525" cap="flat" cmpd="sng" algn="ctr">
+            <a:solidFill>
+              <a:schemeClr val="accent3"/>
+            </a:solidFill>
+            <a:prstDash val="dash"/>
+            <a:round/>
+            <a:headEnd type="none" w="med" len="med"/>
+            <a:tailEnd type="none" w="med" len="med"/>
+          </a:ln>
+        </p:spPr>
+        <p:style>
+          <a:lnRef idx="0">
+            <a:scrgbClr r="0" g="0" b="0"/>
+          </a:lnRef>
+          <a:fillRef idx="0">
+            <a:scrgbClr r="0" g="0" b="0"/>
+          </a:fillRef>
+          <a:effectRef idx="0">
+            <a:scrgbClr r="0" g="0" b="0"/>
+          </a:effectRef>
+          <a:fontRef idx="minor">
+            <a:schemeClr val="tx1"/>
+          </a:fontRef>
+        </p:style>
+      </p:cxnSp>
+      <p:cxnSp>
+        <p:nvCxnSpPr>
+          <p:cNvPr id="62" name="直接连接符 61">
+            <a:extLst>
+              <a:ext uri="{FF2B5EF4-FFF2-40B4-BE49-F238E27FC236}">
+                <a16:creationId xmlns:a16="http://schemas.microsoft.com/office/drawing/2014/main" id="{71513585-2402-4773-B202-B5A94B9B4E68}"/>
+              </a:ext>
+            </a:extLst>
+          </p:cNvPr>
+          <p:cNvCxnSpPr>
+            <a:cxnSpLocks/>
+          </p:cNvCxnSpPr>
+          <p:nvPr/>
+        </p:nvCxnSpPr>
+        <p:spPr>
+          <a:xfrm>
+            <a:off x="3389027" y="3563363"/>
+            <a:ext cx="692899" cy="0"/>
+          </a:xfrm>
+          <a:prstGeom prst="line">
+            <a:avLst/>
+          </a:prstGeom>
+          <a:ln w="9525" cap="flat" cmpd="sng" algn="ctr">
+            <a:solidFill>
+              <a:schemeClr val="accent3"/>
+            </a:solidFill>
+            <a:prstDash val="dash"/>
+            <a:round/>
+            <a:headEnd type="none" w="med" len="med"/>
+            <a:tailEnd type="none" w="med" len="med"/>
+          </a:ln>
+        </p:spPr>
+        <p:style>
+          <a:lnRef idx="0">
+            <a:scrgbClr r="0" g="0" b="0"/>
+          </a:lnRef>
+          <a:fillRef idx="0">
+            <a:scrgbClr r="0" g="0" b="0"/>
+          </a:fillRef>
+          <a:effectRef idx="0">
+            <a:scrgbClr r="0" g="0" b="0"/>
+          </a:effectRef>
+          <a:fontRef idx="minor">
+            <a:schemeClr val="tx1"/>
+          </a:fontRef>
+        </p:style>
+      </p:cxnSp>
+      <p:cxnSp>
+        <p:nvCxnSpPr>
+          <p:cNvPr id="64" name="直接连接符 63">
+            <a:extLst>
+              <a:ext uri="{FF2B5EF4-FFF2-40B4-BE49-F238E27FC236}">
+                <a16:creationId xmlns:a16="http://schemas.microsoft.com/office/drawing/2014/main" id="{F11B205F-0707-4A55-ACA4-3B1022C2AD5E}"/>
+              </a:ext>
+            </a:extLst>
+          </p:cNvPr>
+          <p:cNvCxnSpPr>
+            <a:cxnSpLocks/>
+          </p:cNvCxnSpPr>
+          <p:nvPr/>
+        </p:nvCxnSpPr>
+        <p:spPr>
+          <a:xfrm flipV="1">
+            <a:off x="2956994" y="3312718"/>
+            <a:ext cx="1091773" cy="0"/>
+          </a:xfrm>
+          <a:prstGeom prst="line">
+            <a:avLst/>
+          </a:prstGeom>
+          <a:ln w="9525" cap="flat" cmpd="sng" algn="ctr">
+            <a:solidFill>
+              <a:schemeClr val="accent3"/>
+            </a:solidFill>
+            <a:prstDash val="dash"/>
+            <a:round/>
+            <a:headEnd type="none" w="med" len="med"/>
+            <a:tailEnd type="none" w="med" len="med"/>
+          </a:ln>
+        </p:spPr>
+        <p:style>
+          <a:lnRef idx="0">
+            <a:scrgbClr r="0" g="0" b="0"/>
+          </a:lnRef>
+          <a:fillRef idx="0">
+            <a:scrgbClr r="0" g="0" b="0"/>
+          </a:fillRef>
+          <a:effectRef idx="0">
+            <a:scrgbClr r="0" g="0" b="0"/>
+          </a:effectRef>
+          <a:fontRef idx="minor">
+            <a:schemeClr val="tx1"/>
+          </a:fontRef>
+        </p:style>
+      </p:cxnSp>
+      <p:cxnSp>
+        <p:nvCxnSpPr>
+          <p:cNvPr id="69" name="直接连接符 68">
+            <a:extLst>
+              <a:ext uri="{FF2B5EF4-FFF2-40B4-BE49-F238E27FC236}">
+                <a16:creationId xmlns:a16="http://schemas.microsoft.com/office/drawing/2014/main" id="{C23963EC-181B-4C8C-91B5-30994438B94F}"/>
+              </a:ext>
+            </a:extLst>
+          </p:cNvPr>
+          <p:cNvCxnSpPr>
+            <a:cxnSpLocks/>
+          </p:cNvCxnSpPr>
+          <p:nvPr/>
+        </p:nvCxnSpPr>
+        <p:spPr>
+          <a:xfrm>
+            <a:off x="2961353" y="3050535"/>
+            <a:ext cx="1091773" cy="0"/>
+          </a:xfrm>
+          <a:prstGeom prst="line">
+            <a:avLst/>
+          </a:prstGeom>
+          <a:ln w="9525" cap="flat" cmpd="sng" algn="ctr">
+            <a:solidFill>
+              <a:schemeClr val="accent3"/>
+            </a:solidFill>
+            <a:prstDash val="dash"/>
+            <a:round/>
+            <a:headEnd type="none" w="med" len="med"/>
+            <a:tailEnd type="none" w="med" len="med"/>
+          </a:ln>
+        </p:spPr>
+        <p:style>
+          <a:lnRef idx="0">
+            <a:scrgbClr r="0" g="0" b="0"/>
+          </a:lnRef>
+          <a:fillRef idx="0">
+            <a:scrgbClr r="0" g="0" b="0"/>
+          </a:fillRef>
+          <a:effectRef idx="0">
+            <a:scrgbClr r="0" g="0" b="0"/>
+          </a:effectRef>
+          <a:fontRef idx="minor">
+            <a:schemeClr val="tx1"/>
+          </a:fontRef>
+        </p:style>
+      </p:cxnSp>
+      <p:cxnSp>
+        <p:nvCxnSpPr>
+          <p:cNvPr id="83" name="直接连接符 82">
+            <a:extLst>
+              <a:ext uri="{FF2B5EF4-FFF2-40B4-BE49-F238E27FC236}">
+                <a16:creationId xmlns:a16="http://schemas.microsoft.com/office/drawing/2014/main" id="{2B1DA2A3-4ED3-4440-94B7-BBD22FB36479}"/>
+              </a:ext>
+            </a:extLst>
+          </p:cNvPr>
+          <p:cNvCxnSpPr>
+            <a:cxnSpLocks/>
+          </p:cNvCxnSpPr>
+          <p:nvPr/>
+        </p:nvCxnSpPr>
+        <p:spPr>
+          <a:xfrm flipH="1" flipV="1">
+            <a:off x="2963457" y="2455177"/>
+            <a:ext cx="425570" cy="347684"/>
+          </a:xfrm>
+          <a:prstGeom prst="line">
+            <a:avLst/>
+          </a:prstGeom>
+          <a:ln w="9525" cap="flat" cmpd="sng" algn="ctr">
+            <a:solidFill>
+              <a:schemeClr val="accent3"/>
+            </a:solidFill>
+            <a:prstDash val="dash"/>
+            <a:round/>
+            <a:headEnd type="none" w="med" len="med"/>
+            <a:tailEnd type="none" w="med" len="med"/>
+          </a:ln>
+        </p:spPr>
+        <p:style>
+          <a:lnRef idx="0">
+            <a:scrgbClr r="0" g="0" b="0"/>
+          </a:lnRef>
+          <a:fillRef idx="0">
+            <a:scrgbClr r="0" g="0" b="0"/>
+          </a:fillRef>
+          <a:effectRef idx="0">
+            <a:scrgbClr r="0" g="0" b="0"/>
+          </a:effectRef>
+          <a:fontRef idx="minor">
+            <a:schemeClr val="tx1"/>
+          </a:fontRef>
+        </p:style>
+      </p:cxnSp>
+      <p:cxnSp>
+        <p:nvCxnSpPr>
+          <p:cNvPr id="86" name="直接连接符 85">
+            <a:extLst>
+              <a:ext uri="{FF2B5EF4-FFF2-40B4-BE49-F238E27FC236}">
+                <a16:creationId xmlns:a16="http://schemas.microsoft.com/office/drawing/2014/main" id="{1DDB23F1-BC13-4F76-9BE4-AB93E1600A98}"/>
+              </a:ext>
+            </a:extLst>
+          </p:cNvPr>
+          <p:cNvCxnSpPr>
+            <a:cxnSpLocks/>
+            <a:endCxn id="53" idx="3"/>
+          </p:cNvCxnSpPr>
+          <p:nvPr/>
+        </p:nvCxnSpPr>
+        <p:spPr>
+          <a:xfrm flipH="1">
+            <a:off x="2967787" y="3574901"/>
+            <a:ext cx="421240" cy="355064"/>
+          </a:xfrm>
+          <a:prstGeom prst="line">
+            <a:avLst/>
+          </a:prstGeom>
+          <a:ln w="9525" cap="flat" cmpd="sng" algn="ctr">
+            <a:solidFill>
+              <a:schemeClr val="accent3"/>
+            </a:solidFill>
+            <a:prstDash val="dash"/>
+            <a:round/>
+            <a:headEnd type="none" w="med" len="med"/>
+            <a:tailEnd type="none" w="med" len="med"/>
+          </a:ln>
+        </p:spPr>
+        <p:style>
+          <a:lnRef idx="0">
+            <a:scrgbClr r="0" g="0" b="0"/>
+          </a:lnRef>
+          <a:fillRef idx="0">
+            <a:scrgbClr r="0" g="0" b="0"/>
+          </a:fillRef>
+          <a:effectRef idx="0">
+            <a:scrgbClr r="0" g="0" b="0"/>
+          </a:effectRef>
+          <a:fontRef idx="minor">
+            <a:schemeClr val="tx1"/>
+          </a:fontRef>
+        </p:style>
+      </p:cxnSp>
+      <p:sp>
+        <p:nvSpPr>
+          <p:cNvPr id="5" name="文本框 4">
+            <a:extLst>
+              <a:ext uri="{FF2B5EF4-FFF2-40B4-BE49-F238E27FC236}">
+                <a16:creationId xmlns:a16="http://schemas.microsoft.com/office/drawing/2014/main" id="{D01C0A0C-C039-423C-A515-A9BDBADCF5E6}"/>
+              </a:ext>
+            </a:extLst>
+          </p:cNvPr>
+          <p:cNvSpPr txBox="1"/>
+          <p:nvPr/>
+        </p:nvSpPr>
+        <p:spPr>
+          <a:xfrm>
+            <a:off x="2716455" y="4936165"/>
+            <a:ext cx="4616147" cy="2205732"/>
+          </a:xfrm>
+          <a:prstGeom prst="rect">
+            <a:avLst/>
+          </a:prstGeom>
+          <a:noFill/>
+        </p:spPr>
+        <p:txBody>
+          <a:bodyPr wrap="square" rtlCol="0">
+            <a:spAutoFit/>
+          </a:bodyPr>
+          <a:lstStyle/>
+          <a:p>
+            <a:pPr>
+              <a:lnSpc>
+                <a:spcPts val="2500"/>
+              </a:lnSpc>
+            </a:pPr>
+            <a:r>
+              <a:rPr lang="en-US" sz="1600">
+                <a:latin typeface="Leelawadee UI" panose="020B0502040204020203" pitchFamily="34" charset="-34"/>
+                <a:ea typeface="Microsoft JhengHei Light" panose="020B0304030504040204" pitchFamily="34" charset="-120"/>
+                <a:cs typeface="Leelawadee UI" panose="020B0502040204020203" pitchFamily="34" charset="-34"/>
+              </a:rPr>
+              <a:t>GND: </a:t>
+            </a:r>
+            <a:r>
+              <a:rPr lang="zh-CN" altLang="en-US" sz="1600">
+                <a:latin typeface="华文楷体" panose="02010600040101010101" pitchFamily="2" charset="-122"/>
+                <a:ea typeface="华文楷体" panose="02010600040101010101" pitchFamily="2" charset="-122"/>
+                <a:cs typeface="Leelawadee UI" panose="020B0502040204020203" pitchFamily="34" charset="-34"/>
+              </a:rPr>
+              <a:t>将此模块</a:t>
+            </a:r>
+            <a:r>
+              <a:rPr lang="zh-CN" altLang="en-US" sz="1600">
+                <a:latin typeface="Leelawadee UI" panose="020B0502040204020203" pitchFamily="34" charset="-34"/>
+                <a:ea typeface="Microsoft JhengHei Light" panose="020B0304030504040204" pitchFamily="34" charset="-120"/>
+                <a:cs typeface="Leelawadee UI" panose="020B0502040204020203" pitchFamily="34" charset="-34"/>
+              </a:rPr>
+              <a:t> </a:t>
+            </a:r>
+            <a:r>
+              <a:rPr lang="en-US" altLang="zh-CN" sz="1600">
+                <a:latin typeface="Leelawadee UI" panose="020B0502040204020203" pitchFamily="34" charset="-34"/>
+                <a:ea typeface="Microsoft JhengHei Light" panose="020B0304030504040204" pitchFamily="34" charset="-120"/>
+                <a:cs typeface="Leelawadee UI" panose="020B0502040204020203" pitchFamily="34" charset="-34"/>
+              </a:rPr>
+              <a:t>GND </a:t>
+            </a:r>
+            <a:r>
+              <a:rPr lang="zh-CN" altLang="en-US" sz="1600">
+                <a:latin typeface="华文楷体" panose="02010600040101010101" pitchFamily="2" charset="-122"/>
+                <a:ea typeface="华文楷体" panose="02010600040101010101" pitchFamily="2" charset="-122"/>
+                <a:cs typeface="Leelawadee UI" panose="020B0502040204020203" pitchFamily="34" charset="-34"/>
+              </a:rPr>
+              <a:t>连接到系统 </a:t>
+            </a:r>
+            <a:r>
+              <a:rPr lang="en-US" altLang="zh-CN" sz="1600">
+                <a:latin typeface="Leelawadee UI" panose="020B0502040204020203" pitchFamily="34" charset="-34"/>
+                <a:ea typeface="Microsoft JhengHei Light" panose="020B0304030504040204" pitchFamily="34" charset="-120"/>
+                <a:cs typeface="Leelawadee UI" panose="020B0502040204020203" pitchFamily="34" charset="-34"/>
+              </a:rPr>
+              <a:t>GND</a:t>
+            </a:r>
+            <a:r>
+              <a:rPr lang="en-US" sz="1600">
+                <a:latin typeface="Leelawadee UI" panose="020B0502040204020203" pitchFamily="34" charset="-34"/>
+                <a:ea typeface="Microsoft JhengHei Light" panose="020B0304030504040204" pitchFamily="34" charset="-120"/>
+                <a:cs typeface="Leelawadee UI" panose="020B0502040204020203" pitchFamily="34" charset="-34"/>
+              </a:rPr>
+              <a:t> </a:t>
+            </a:r>
+          </a:p>
+          <a:p>
+            <a:pPr>
+              <a:lnSpc>
+                <a:spcPts val="2500"/>
+              </a:lnSpc>
+            </a:pPr>
+            <a:r>
+              <a:rPr lang="en-US" sz="1600">
+                <a:latin typeface="Leelawadee UI" panose="020B0502040204020203" pitchFamily="34" charset="-34"/>
+                <a:ea typeface="Microsoft JhengHei Light" panose="020B0304030504040204" pitchFamily="34" charset="-120"/>
+                <a:cs typeface="Leelawadee UI" panose="020B0502040204020203" pitchFamily="34" charset="-34"/>
+              </a:rPr>
+              <a:t>VCC: </a:t>
+            </a:r>
+            <a:r>
+              <a:rPr lang="zh-CN" altLang="en-US" sz="1600">
+                <a:latin typeface="华文楷体" panose="02010600040101010101" pitchFamily="2" charset="-122"/>
+                <a:ea typeface="华文楷体" panose="02010600040101010101" pitchFamily="2" charset="-122"/>
+                <a:cs typeface="Leelawadee UI" panose="020B0502040204020203" pitchFamily="34" charset="-34"/>
+              </a:rPr>
+              <a:t>您可使用</a:t>
+            </a:r>
+            <a:r>
+              <a:rPr lang="en-US" sz="1600">
+                <a:latin typeface="华文楷体" panose="02010600040101010101" pitchFamily="2" charset="-122"/>
+                <a:ea typeface="华文楷体" panose="02010600040101010101" pitchFamily="2" charset="-122"/>
+                <a:cs typeface="Leelawadee UI" panose="020B0502040204020203" pitchFamily="34" charset="-34"/>
+              </a:rPr>
+              <a:t> </a:t>
+            </a:r>
+            <a:r>
+              <a:rPr lang="en-US" sz="1600">
+                <a:latin typeface="Leelawadee UI" panose="020B0502040204020203" pitchFamily="34" charset="-34"/>
+                <a:ea typeface="Microsoft JhengHei Light" panose="020B0304030504040204" pitchFamily="34" charset="-120"/>
+                <a:cs typeface="Leelawadee UI" panose="020B0502040204020203" pitchFamily="34" charset="-34"/>
+              </a:rPr>
+              <a:t>5V </a:t>
+            </a:r>
+            <a:r>
+              <a:rPr lang="zh-CN" altLang="en-US" sz="1600">
+                <a:latin typeface="华文楷体" panose="02010600040101010101" pitchFamily="2" charset="-122"/>
+                <a:ea typeface="华文楷体" panose="02010600040101010101" pitchFamily="2" charset="-122"/>
+                <a:cs typeface="Leelawadee UI" panose="020B0502040204020203" pitchFamily="34" charset="-34"/>
+              </a:rPr>
+              <a:t>或</a:t>
+            </a:r>
+            <a:r>
+              <a:rPr lang="en-US" sz="1600">
+                <a:latin typeface="Leelawadee UI" panose="020B0502040204020203" pitchFamily="34" charset="-34"/>
+                <a:ea typeface="Microsoft JhengHei Light" panose="020B0304030504040204" pitchFamily="34" charset="-120"/>
+                <a:cs typeface="Leelawadee UI" panose="020B0502040204020203" pitchFamily="34" charset="-34"/>
+              </a:rPr>
+              <a:t> 3.3V</a:t>
+            </a:r>
+          </a:p>
+          <a:p>
+            <a:pPr>
+              <a:lnSpc>
+                <a:spcPts val="2500"/>
+              </a:lnSpc>
+            </a:pPr>
+            <a:r>
+              <a:rPr lang="en-US" sz="1600">
+                <a:latin typeface="Leelawadee UI" panose="020B0502040204020203" pitchFamily="34" charset="-34"/>
+                <a:ea typeface="Microsoft JhengHei Light" panose="020B0304030504040204" pitchFamily="34" charset="-120"/>
+                <a:cs typeface="Leelawadee UI" panose="020B0502040204020203" pitchFamily="34" charset="-34"/>
+              </a:rPr>
+              <a:t>SDA: I</a:t>
+            </a:r>
+            <a:r>
+              <a:rPr lang="en-US" sz="1600" baseline="30000">
+                <a:latin typeface="Leelawadee UI" panose="020B0502040204020203" pitchFamily="34" charset="-34"/>
+                <a:ea typeface="Microsoft JhengHei Light" panose="020B0304030504040204" pitchFamily="34" charset="-120"/>
+                <a:cs typeface="Leelawadee UI" panose="020B0502040204020203" pitchFamily="34" charset="-34"/>
+              </a:rPr>
+              <a:t>2</a:t>
+            </a:r>
+            <a:r>
+              <a:rPr lang="en-US" sz="1600">
+                <a:latin typeface="Leelawadee UI" panose="020B0502040204020203" pitchFamily="34" charset="-34"/>
+                <a:ea typeface="Microsoft JhengHei Light" panose="020B0304030504040204" pitchFamily="34" charset="-120"/>
+                <a:cs typeface="Leelawadee UI" panose="020B0502040204020203" pitchFamily="34" charset="-34"/>
+              </a:rPr>
+              <a:t>C </a:t>
+            </a:r>
+            <a:r>
+              <a:rPr lang="zh-CN" altLang="en-US" sz="1600">
+                <a:latin typeface="华文楷体" panose="02010600040101010101" pitchFamily="2" charset="-122"/>
+                <a:ea typeface="华文楷体" panose="02010600040101010101" pitchFamily="2" charset="-122"/>
+                <a:cs typeface="Leelawadee UI" panose="020B0502040204020203" pitchFamily="34" charset="-34"/>
+              </a:rPr>
+              <a:t>串行数据</a:t>
+            </a:r>
+            <a:endParaRPr lang="en-US" sz="1600">
+              <a:latin typeface="华文楷体" panose="02010600040101010101" pitchFamily="2" charset="-122"/>
+              <a:ea typeface="华文楷体" panose="02010600040101010101" pitchFamily="2" charset="-122"/>
+              <a:cs typeface="Leelawadee UI" panose="020B0502040204020203" pitchFamily="34" charset="-34"/>
+            </a:endParaRPr>
+          </a:p>
+          <a:p>
+            <a:pPr>
+              <a:lnSpc>
+                <a:spcPts val="2500"/>
+              </a:lnSpc>
+            </a:pPr>
+            <a:r>
+              <a:rPr lang="en-US" sz="1600">
+                <a:latin typeface="Leelawadee UI" panose="020B0502040204020203" pitchFamily="34" charset="-34"/>
+                <a:ea typeface="Microsoft JhengHei Light" panose="020B0304030504040204" pitchFamily="34" charset="-120"/>
+                <a:cs typeface="Leelawadee UI" panose="020B0502040204020203" pitchFamily="34" charset="-34"/>
+              </a:rPr>
+              <a:t>SCL: I</a:t>
+            </a:r>
+            <a:r>
+              <a:rPr lang="en-US" sz="1600" baseline="30000">
+                <a:latin typeface="Leelawadee UI" panose="020B0502040204020203" pitchFamily="34" charset="-34"/>
+                <a:ea typeface="Microsoft JhengHei Light" panose="020B0304030504040204" pitchFamily="34" charset="-120"/>
+                <a:cs typeface="Leelawadee UI" panose="020B0502040204020203" pitchFamily="34" charset="-34"/>
+              </a:rPr>
+              <a:t>2</a:t>
+            </a:r>
+            <a:r>
+              <a:rPr lang="en-US" sz="1600">
+                <a:latin typeface="Leelawadee UI" panose="020B0502040204020203" pitchFamily="34" charset="-34"/>
+                <a:ea typeface="Microsoft JhengHei Light" panose="020B0304030504040204" pitchFamily="34" charset="-120"/>
+                <a:cs typeface="Leelawadee UI" panose="020B0502040204020203" pitchFamily="34" charset="-34"/>
+              </a:rPr>
+              <a:t>C </a:t>
+            </a:r>
+            <a:r>
+              <a:rPr lang="zh-CN" altLang="en-US" sz="1600">
+                <a:latin typeface="华文楷体" panose="02010600040101010101" pitchFamily="2" charset="-122"/>
+                <a:ea typeface="华文楷体" panose="02010600040101010101" pitchFamily="2" charset="-122"/>
+                <a:cs typeface="Leelawadee UI" panose="020B0502040204020203" pitchFamily="34" charset="-34"/>
+              </a:rPr>
+              <a:t>串行时钟</a:t>
+            </a:r>
+            <a:endParaRPr lang="en-US" sz="1600">
+              <a:latin typeface="华文楷体" panose="02010600040101010101" pitchFamily="2" charset="-122"/>
+              <a:ea typeface="华文楷体" panose="02010600040101010101" pitchFamily="2" charset="-122"/>
+              <a:cs typeface="Leelawadee UI" panose="020B0502040204020203" pitchFamily="34" charset="-34"/>
+            </a:endParaRPr>
+          </a:p>
+          <a:p>
+            <a:endParaRPr lang="en-US" sz="1200">
+              <a:solidFill>
+                <a:srgbClr val="D4D4D4"/>
+              </a:solidFill>
+              <a:latin typeface="Consolas" panose="020B0609020204030204" pitchFamily="49" charset="0"/>
+            </a:endParaRPr>
+          </a:p>
+          <a:p>
+            <a:endParaRPr lang="en-US" sz="1200">
+              <a:latin typeface="Times New Roman" panose="02020603050405020304" pitchFamily="18" charset="0"/>
+              <a:cs typeface="Times New Roman" panose="02020603050405020304" pitchFamily="18" charset="0"/>
+            </a:endParaRPr>
+          </a:p>
+          <a:p>
+            <a:endParaRPr lang="en-US" sz="1200">
+              <a:latin typeface="Times New Roman" panose="02020603050405020304" pitchFamily="18" charset="0"/>
+              <a:cs typeface="Times New Roman" panose="02020603050405020304" pitchFamily="18" charset="0"/>
+            </a:endParaRPr>
+          </a:p>
+          <a:p>
+            <a:endParaRPr lang="en-US"/>
+          </a:p>
+        </p:txBody>
+      </p:sp>
+      <p:grpSp>
+        <p:nvGrpSpPr>
+          <p:cNvPr id="2" name="组合 1">
+            <a:extLst>
+              <a:ext uri="{FF2B5EF4-FFF2-40B4-BE49-F238E27FC236}">
+                <a16:creationId xmlns:a16="http://schemas.microsoft.com/office/drawing/2014/main" id="{824D493F-1853-4A3A-86B7-C95C01AE00F9}"/>
+              </a:ext>
+            </a:extLst>
+          </p:cNvPr>
+          <p:cNvGrpSpPr/>
+          <p:nvPr/>
+        </p:nvGrpSpPr>
+        <p:grpSpPr>
+          <a:xfrm>
+            <a:off x="2491537" y="2281664"/>
+            <a:ext cx="476250" cy="1886426"/>
+            <a:chOff x="2261625" y="1357253"/>
+            <a:chExt cx="476250" cy="1886426"/>
+          </a:xfrm>
+        </p:grpSpPr>
+        <p:pic>
+          <p:nvPicPr>
+            <p:cNvPr id="48" name="图片 47">
+              <a:extLst>
+                <a:ext uri="{FF2B5EF4-FFF2-40B4-BE49-F238E27FC236}">
+                  <a16:creationId xmlns:a16="http://schemas.microsoft.com/office/drawing/2014/main" id="{6A1EF724-C083-4718-B12B-ADE4CD6E6593}"/>
+                </a:ext>
+              </a:extLst>
+            </p:cNvPr>
+            <p:cNvPicPr>
+              <a:picLocks noChangeAspect="1"/>
+            </p:cNvPicPr>
+            <p:nvPr/>
+          </p:nvPicPr>
+          <p:blipFill>
+            <a:blip r:embed="rId3">
+              <a:extLst>
+                <a:ext uri="{28A0092B-C50C-407E-A947-70E740481C1C}">
+                  <a14:useLocalDpi xmlns:a14="http://schemas.microsoft.com/office/drawing/2010/main" val="0"/>
+                </a:ext>
+              </a:extLst>
+            </a:blip>
+            <a:stretch>
+              <a:fillRect/>
+            </a:stretch>
+          </p:blipFill>
+          <p:spPr>
+            <a:xfrm>
+              <a:off x="2261625" y="1827312"/>
+              <a:ext cx="476250" cy="476250"/>
+            </a:xfrm>
+            <a:prstGeom prst="rect">
+              <a:avLst/>
+            </a:prstGeom>
+          </p:spPr>
+        </p:pic>
+        <p:pic>
+          <p:nvPicPr>
+            <p:cNvPr id="51" name="图片 50">
+              <a:extLst>
+                <a:ext uri="{FF2B5EF4-FFF2-40B4-BE49-F238E27FC236}">
+                  <a16:creationId xmlns:a16="http://schemas.microsoft.com/office/drawing/2014/main" id="{B4A0FEB6-8C80-4A2D-A4DA-3DD6CF6BF267}"/>
+                </a:ext>
+              </a:extLst>
+            </p:cNvPr>
+            <p:cNvPicPr>
+              <a:picLocks noChangeAspect="1"/>
+            </p:cNvPicPr>
+            <p:nvPr/>
+          </p:nvPicPr>
+          <p:blipFill>
+            <a:blip r:embed="rId4">
+              <a:extLst>
+                <a:ext uri="{28A0092B-C50C-407E-A947-70E740481C1C}">
+                  <a14:useLocalDpi xmlns:a14="http://schemas.microsoft.com/office/drawing/2010/main" val="0"/>
+                </a:ext>
+              </a:extLst>
+            </a:blip>
+            <a:stretch>
+              <a:fillRect/>
+            </a:stretch>
+          </p:blipFill>
+          <p:spPr>
+            <a:xfrm>
+              <a:off x="2261625" y="1357253"/>
+              <a:ext cx="476250" cy="476250"/>
+            </a:xfrm>
+            <a:prstGeom prst="rect">
+              <a:avLst/>
+            </a:prstGeom>
+          </p:spPr>
+        </p:pic>
+        <p:pic>
+          <p:nvPicPr>
+            <p:cNvPr id="53" name="图片 52">
+              <a:extLst>
+                <a:ext uri="{FF2B5EF4-FFF2-40B4-BE49-F238E27FC236}">
+                  <a16:creationId xmlns:a16="http://schemas.microsoft.com/office/drawing/2014/main" id="{F5F78553-6083-4B94-9258-235169F8D486}"/>
+                </a:ext>
+              </a:extLst>
+            </p:cNvPr>
+            <p:cNvPicPr>
+              <a:picLocks noChangeAspect="1"/>
+            </p:cNvPicPr>
+            <p:nvPr/>
+          </p:nvPicPr>
+          <p:blipFill>
+            <a:blip r:embed="rId5">
+              <a:extLst>
+                <a:ext uri="{28A0092B-C50C-407E-A947-70E740481C1C}">
+                  <a14:useLocalDpi xmlns:a14="http://schemas.microsoft.com/office/drawing/2010/main" val="0"/>
+                </a:ext>
+              </a:extLst>
+            </a:blip>
+            <a:stretch>
+              <a:fillRect/>
+            </a:stretch>
+          </p:blipFill>
+          <p:spPr>
+            <a:xfrm>
+              <a:off x="2261625" y="2767429"/>
+              <a:ext cx="476250" cy="476250"/>
+            </a:xfrm>
+            <a:prstGeom prst="rect">
+              <a:avLst/>
+            </a:prstGeom>
+          </p:spPr>
+        </p:pic>
+        <p:pic>
+          <p:nvPicPr>
+            <p:cNvPr id="55" name="图片 54">
+              <a:extLst>
+                <a:ext uri="{FF2B5EF4-FFF2-40B4-BE49-F238E27FC236}">
+                  <a16:creationId xmlns:a16="http://schemas.microsoft.com/office/drawing/2014/main" id="{78F94C4E-FBEE-4618-B471-EC4E70DB63F7}"/>
+                </a:ext>
+              </a:extLst>
+            </p:cNvPr>
+            <p:cNvPicPr>
+              <a:picLocks noChangeAspect="1"/>
+            </p:cNvPicPr>
+            <p:nvPr/>
+          </p:nvPicPr>
+          <p:blipFill>
+            <a:blip r:embed="rId6">
+              <a:extLst>
+                <a:ext uri="{28A0092B-C50C-407E-A947-70E740481C1C}">
+                  <a14:useLocalDpi xmlns:a14="http://schemas.microsoft.com/office/drawing/2010/main" val="0"/>
+                </a:ext>
+              </a:extLst>
+            </a:blip>
+            <a:stretch>
+              <a:fillRect/>
+            </a:stretch>
+          </p:blipFill>
+          <p:spPr>
+            <a:xfrm>
+              <a:off x="2261625" y="2297371"/>
+              <a:ext cx="476250" cy="476250"/>
+            </a:xfrm>
+            <a:prstGeom prst="rect">
+              <a:avLst/>
+            </a:prstGeom>
+          </p:spPr>
+        </p:pic>
+      </p:grpSp>
+      <p:pic>
+        <p:nvPicPr>
+          <p:cNvPr id="63" name="图片 62">
+            <a:extLst>
+              <a:ext uri="{FF2B5EF4-FFF2-40B4-BE49-F238E27FC236}">
+                <a16:creationId xmlns:a16="http://schemas.microsoft.com/office/drawing/2014/main" id="{A383C15E-94CC-4AB9-857B-0F901B5558E8}"/>
+              </a:ext>
+            </a:extLst>
+          </p:cNvPr>
+          <p:cNvPicPr>
+            <a:picLocks noChangeAspect="1"/>
+          </p:cNvPicPr>
+          <p:nvPr/>
+        </p:nvPicPr>
+        <p:blipFill>
+          <a:blip r:embed="rId3">
+            <a:extLst>
+              <a:ext uri="{28A0092B-C50C-407E-A947-70E740481C1C}">
+                <a14:useLocalDpi xmlns:a14="http://schemas.microsoft.com/office/drawing/2010/main" val="0"/>
+              </a:ext>
+            </a:extLst>
+          </a:blip>
+          <a:stretch>
+            <a:fillRect/>
+          </a:stretch>
+        </p:blipFill>
+        <p:spPr>
+          <a:xfrm>
+            <a:off x="2513309" y="5330991"/>
+            <a:ext cx="266700" cy="266700"/>
+          </a:xfrm>
+          <a:prstGeom prst="rect">
+            <a:avLst/>
+          </a:prstGeom>
+        </p:spPr>
+      </p:pic>
+      <p:pic>
+        <p:nvPicPr>
+          <p:cNvPr id="65" name="图片 64">
+            <a:extLst>
+              <a:ext uri="{FF2B5EF4-FFF2-40B4-BE49-F238E27FC236}">
+                <a16:creationId xmlns:a16="http://schemas.microsoft.com/office/drawing/2014/main" id="{F2711110-C802-4745-8C7A-EE197611809A}"/>
+              </a:ext>
+            </a:extLst>
+          </p:cNvPr>
+          <p:cNvPicPr>
+            <a:picLocks noChangeAspect="1"/>
+          </p:cNvPicPr>
+          <p:nvPr/>
+        </p:nvPicPr>
+        <p:blipFill>
+          <a:blip r:embed="rId4">
+            <a:extLst>
+              <a:ext uri="{28A0092B-C50C-407E-A947-70E740481C1C}">
+                <a14:useLocalDpi xmlns:a14="http://schemas.microsoft.com/office/drawing/2010/main" val="0"/>
+              </a:ext>
+            </a:extLst>
+          </a:blip>
+          <a:stretch>
+            <a:fillRect/>
+          </a:stretch>
+        </p:blipFill>
+        <p:spPr>
+          <a:xfrm>
+            <a:off x="2513309" y="5014686"/>
+            <a:ext cx="266700" cy="266700"/>
+          </a:xfrm>
+          <a:prstGeom prst="rect">
+            <a:avLst/>
+          </a:prstGeom>
+        </p:spPr>
+      </p:pic>
+      <p:pic>
+        <p:nvPicPr>
+          <p:cNvPr id="66" name="图片 65">
+            <a:extLst>
+              <a:ext uri="{FF2B5EF4-FFF2-40B4-BE49-F238E27FC236}">
+                <a16:creationId xmlns:a16="http://schemas.microsoft.com/office/drawing/2014/main" id="{6D42253D-4577-468B-9D40-058E91BD3363}"/>
+              </a:ext>
+            </a:extLst>
+          </p:cNvPr>
+          <p:cNvPicPr>
+            <a:picLocks noChangeAspect="1"/>
+          </p:cNvPicPr>
+          <p:nvPr/>
+        </p:nvPicPr>
+        <p:blipFill>
+          <a:blip r:embed="rId5">
+            <a:extLst>
+              <a:ext uri="{28A0092B-C50C-407E-A947-70E740481C1C}">
+                <a14:useLocalDpi xmlns:a14="http://schemas.microsoft.com/office/drawing/2010/main" val="0"/>
+              </a:ext>
+            </a:extLst>
+          </a:blip>
+          <a:stretch>
+            <a:fillRect/>
+          </a:stretch>
+        </p:blipFill>
+        <p:spPr>
+          <a:xfrm>
+            <a:off x="2513309" y="5963604"/>
+            <a:ext cx="266700" cy="266700"/>
+          </a:xfrm>
+          <a:prstGeom prst="rect">
+            <a:avLst/>
+          </a:prstGeom>
+        </p:spPr>
+      </p:pic>
+      <p:pic>
+        <p:nvPicPr>
+          <p:cNvPr id="67" name="图片 66">
+            <a:extLst>
+              <a:ext uri="{FF2B5EF4-FFF2-40B4-BE49-F238E27FC236}">
+                <a16:creationId xmlns:a16="http://schemas.microsoft.com/office/drawing/2014/main" id="{1A425AE3-AA60-415F-BD5E-43BFD600013A}"/>
+              </a:ext>
+            </a:extLst>
+          </p:cNvPr>
+          <p:cNvPicPr>
+            <a:picLocks noChangeAspect="1"/>
+          </p:cNvPicPr>
+          <p:nvPr/>
+        </p:nvPicPr>
+        <p:blipFill>
+          <a:blip r:embed="rId6">
+            <a:extLst>
+              <a:ext uri="{28A0092B-C50C-407E-A947-70E740481C1C}">
+                <a14:useLocalDpi xmlns:a14="http://schemas.microsoft.com/office/drawing/2010/main" val="0"/>
+              </a:ext>
+            </a:extLst>
+          </a:blip>
+          <a:stretch>
+            <a:fillRect/>
+          </a:stretch>
+        </p:blipFill>
+        <p:spPr>
+          <a:xfrm>
+            <a:off x="2513309" y="5647298"/>
+            <a:ext cx="266700" cy="266700"/>
+          </a:xfrm>
+          <a:prstGeom prst="rect">
+            <a:avLst/>
+          </a:prstGeom>
+        </p:spPr>
+      </p:pic>
+    </p:spTree>
+    <p:extLst>
+      <p:ext uri="{BB962C8B-B14F-4D97-AF65-F5344CB8AC3E}">
+        <p14:creationId xmlns:p14="http://schemas.microsoft.com/office/powerpoint/2010/main" val="1017762970"/>
+      </p:ext>
+    </p:extLst>
+  </p:cSld>
+  <p:clrMapOvr>
+    <a:masterClrMapping/>
+  </p:clrMapOvr>
+</p:sld>
+</file>
+
+<file path=ppt/slides/slide4.xml><?xml version="1.0" encoding="utf-8"?>
+<p:sld xmlns:a="http://schemas.openxmlformats.org/drawingml/2006/main" xmlns:r="http://schemas.openxmlformats.org/officeDocument/2006/relationships" xmlns:p="http://schemas.openxmlformats.org/presentationml/2006/main">
+  <p:cSld>
+    <p:spTree>
+      <p:nvGrpSpPr>
+        <p:cNvPr id="1" name=""/>
+        <p:cNvGrpSpPr/>
+        <p:nvPr/>
+      </p:nvGrpSpPr>
+      <p:grpSpPr>
+        <a:xfrm>
+          <a:off x="0" y="0"/>
+          <a:ext cx="0" cy="0"/>
+          <a:chOff x="0" y="0"/>
+          <a:chExt cx="0" cy="0"/>
+        </a:xfrm>
+      </p:grpSpPr>
+      <p:pic>
+        <p:nvPicPr>
+          <p:cNvPr id="4" name="图片 3">
+            <a:extLst>
+              <a:ext uri="{FF2B5EF4-FFF2-40B4-BE49-F238E27FC236}">
+                <a16:creationId xmlns:a16="http://schemas.microsoft.com/office/drawing/2014/main" id="{AA33280D-08F0-4FE4-8C33-45F89E073763}"/>
+              </a:ext>
+            </a:extLst>
+          </p:cNvPr>
+          <p:cNvPicPr>
+            <a:picLocks noChangeAspect="1"/>
+          </p:cNvPicPr>
+          <p:nvPr/>
+        </p:nvPicPr>
+        <p:blipFill>
+          <a:blip r:embed="rId2">
+            <a:extLst>
+              <a:ext uri="{28A0092B-C50C-407E-A947-70E740481C1C}">
+                <a14:useLocalDpi xmlns:a14="http://schemas.microsoft.com/office/drawing/2010/main" val="0"/>
+              </a:ext>
+            </a:extLst>
+          </a:blip>
+          <a:stretch>
+            <a:fillRect/>
+          </a:stretch>
+        </p:blipFill>
+        <p:spPr>
+          <a:xfrm>
+            <a:off x="2609921" y="914491"/>
+            <a:ext cx="6571488" cy="4928616"/>
+          </a:xfrm>
+          <a:prstGeom prst="rect">
+            <a:avLst/>
+          </a:prstGeom>
+        </p:spPr>
+      </p:pic>
+      <p:sp>
+        <p:nvSpPr>
+          <p:cNvPr id="36" name="矩形 35">
+            <a:extLst>
+              <a:ext uri="{FF2B5EF4-FFF2-40B4-BE49-F238E27FC236}">
+                <a16:creationId xmlns:a16="http://schemas.microsoft.com/office/drawing/2014/main" id="{4F8792F2-80BA-4B38-AA3C-C8FFBDA36F43}"/>
+              </a:ext>
+            </a:extLst>
+          </p:cNvPr>
+          <p:cNvSpPr/>
+          <p:nvPr/>
+        </p:nvSpPr>
+        <p:spPr>
+          <a:xfrm rot="5400000">
+            <a:off x="6076449" y="789801"/>
+            <a:ext cx="198448" cy="249381"/>
+          </a:xfrm>
+          <a:prstGeom prst="rect">
+            <a:avLst/>
+          </a:prstGeom>
+          <a:ln>
+            <a:noFill/>
+          </a:ln>
+        </p:spPr>
+        <p:style>
+          <a:lnRef idx="2">
+            <a:schemeClr val="accent3">
+              <a:shade val="50000"/>
+            </a:schemeClr>
+          </a:lnRef>
+          <a:fillRef idx="1">
+            <a:schemeClr val="accent3"/>
+          </a:fillRef>
+          <a:effectRef idx="0">
+            <a:schemeClr val="accent3"/>
+          </a:effectRef>
+          <a:fontRef idx="minor">
+            <a:schemeClr val="lt1"/>
+          </a:fontRef>
+        </p:style>
+        <p:txBody>
+          <a:bodyPr rtlCol="0" anchor="ctr"/>
+          <a:lstStyle/>
+          <a:p>
+            <a:pPr algn="ctr"/>
+            <a:endParaRPr lang="en-US"/>
+          </a:p>
+        </p:txBody>
+      </p:sp>
+      <p:cxnSp>
+        <p:nvCxnSpPr>
+          <p:cNvPr id="59" name="直接连接符 58">
+            <a:extLst>
+              <a:ext uri="{FF2B5EF4-FFF2-40B4-BE49-F238E27FC236}">
+                <a16:creationId xmlns:a16="http://schemas.microsoft.com/office/drawing/2014/main" id="{554D8D14-D48D-45F6-89A6-634C964B8AE8}"/>
+              </a:ext>
+            </a:extLst>
+          </p:cNvPr>
+          <p:cNvCxnSpPr>
+            <a:cxnSpLocks/>
+          </p:cNvCxnSpPr>
+          <p:nvPr/>
+        </p:nvCxnSpPr>
+        <p:spPr>
+          <a:xfrm>
+            <a:off x="2726859" y="2637715"/>
+            <a:ext cx="1005840" cy="0"/>
+          </a:xfrm>
+          <a:prstGeom prst="line">
+            <a:avLst/>
+          </a:prstGeom>
+          <a:ln w="15875" cap="flat" cmpd="sng" algn="ctr">
+            <a:solidFill>
+              <a:schemeClr val="bg1">
+                <a:lumMod val="75000"/>
+              </a:schemeClr>
+            </a:solidFill>
+            <a:prstDash val="dash"/>
+            <a:round/>
+            <a:headEnd type="none" w="med" len="med"/>
+            <a:tailEnd type="none" w="med" len="med"/>
+          </a:ln>
+        </p:spPr>
+        <p:style>
+          <a:lnRef idx="0">
+            <a:scrgbClr r="0" g="0" b="0"/>
+          </a:lnRef>
+          <a:fillRef idx="0">
+            <a:scrgbClr r="0" g="0" b="0"/>
+          </a:fillRef>
+          <a:effectRef idx="0">
+            <a:scrgbClr r="0" g="0" b="0"/>
+          </a:effectRef>
+          <a:fontRef idx="minor">
+            <a:schemeClr val="tx1"/>
+          </a:fontRef>
+        </p:style>
+      </p:cxnSp>
+      <p:cxnSp>
+        <p:nvCxnSpPr>
+          <p:cNvPr id="62" name="直接连接符 61">
+            <a:extLst>
+              <a:ext uri="{FF2B5EF4-FFF2-40B4-BE49-F238E27FC236}">
+                <a16:creationId xmlns:a16="http://schemas.microsoft.com/office/drawing/2014/main" id="{71513585-2402-4773-B202-B5A94B9B4E68}"/>
+              </a:ext>
+            </a:extLst>
+          </p:cNvPr>
+          <p:cNvCxnSpPr>
+            <a:cxnSpLocks/>
+          </p:cNvCxnSpPr>
+          <p:nvPr/>
+        </p:nvCxnSpPr>
+        <p:spPr>
+          <a:xfrm>
+            <a:off x="2726859" y="2928165"/>
+            <a:ext cx="1005840" cy="0"/>
+          </a:xfrm>
+          <a:prstGeom prst="line">
+            <a:avLst/>
+          </a:prstGeom>
+          <a:ln w="15875" cap="flat" cmpd="sng" algn="ctr">
+            <a:solidFill>
+              <a:schemeClr val="bg1">
+                <a:lumMod val="75000"/>
+              </a:schemeClr>
+            </a:solidFill>
+            <a:prstDash val="dash"/>
+            <a:round/>
+            <a:headEnd type="none" w="med" len="med"/>
+            <a:tailEnd type="none" w="med" len="med"/>
+          </a:ln>
+        </p:spPr>
+        <p:style>
+          <a:lnRef idx="0">
+            <a:scrgbClr r="0" g="0" b="0"/>
+          </a:lnRef>
+          <a:fillRef idx="0">
+            <a:scrgbClr r="0" g="0" b="0"/>
+          </a:fillRef>
+          <a:effectRef idx="0">
+            <a:scrgbClr r="0" g="0" b="0"/>
+          </a:effectRef>
+          <a:fontRef idx="minor">
+            <a:schemeClr val="tx1"/>
+          </a:fontRef>
+        </p:style>
+      </p:cxnSp>
+      <p:cxnSp>
+        <p:nvCxnSpPr>
+          <p:cNvPr id="83" name="直接连接符 82">
+            <a:extLst>
+              <a:ext uri="{FF2B5EF4-FFF2-40B4-BE49-F238E27FC236}">
+                <a16:creationId xmlns:a16="http://schemas.microsoft.com/office/drawing/2014/main" id="{2B1DA2A3-4ED3-4440-94B7-BBD22FB36479}"/>
+              </a:ext>
+            </a:extLst>
+          </p:cNvPr>
+          <p:cNvCxnSpPr>
+            <a:cxnSpLocks/>
+          </p:cNvCxnSpPr>
+          <p:nvPr/>
+        </p:nvCxnSpPr>
+        <p:spPr>
+          <a:xfrm flipH="1" flipV="1">
+            <a:off x="5085112" y="1721915"/>
+            <a:ext cx="542802" cy="557850"/>
+          </a:xfrm>
+          <a:prstGeom prst="line">
+            <a:avLst/>
+          </a:prstGeom>
+          <a:ln w="15875" cap="flat" cmpd="sng" algn="ctr">
+            <a:solidFill>
+              <a:schemeClr val="bg1">
+                <a:lumMod val="75000"/>
+              </a:schemeClr>
+            </a:solidFill>
+            <a:prstDash val="dash"/>
+            <a:round/>
+            <a:headEnd type="none" w="med" len="med"/>
+            <a:tailEnd type="none" w="med" len="med"/>
+          </a:ln>
+        </p:spPr>
+        <p:style>
+          <a:lnRef idx="0">
+            <a:scrgbClr r="0" g="0" b="0"/>
+          </a:lnRef>
+          <a:fillRef idx="0">
+            <a:scrgbClr r="0" g="0" b="0"/>
+          </a:fillRef>
+          <a:effectRef idx="0">
+            <a:scrgbClr r="0" g="0" b="0"/>
+          </a:effectRef>
+          <a:fontRef idx="minor">
+            <a:schemeClr val="tx1"/>
+          </a:fontRef>
+        </p:style>
+      </p:cxnSp>
+      <p:cxnSp>
+        <p:nvCxnSpPr>
+          <p:cNvPr id="86" name="直接连接符 85">
+            <a:extLst>
+              <a:ext uri="{FF2B5EF4-FFF2-40B4-BE49-F238E27FC236}">
+                <a16:creationId xmlns:a16="http://schemas.microsoft.com/office/drawing/2014/main" id="{1DDB23F1-BC13-4F76-9BE4-AB93E1600A98}"/>
+              </a:ext>
+            </a:extLst>
+          </p:cNvPr>
+          <p:cNvCxnSpPr>
+            <a:cxnSpLocks/>
+          </p:cNvCxnSpPr>
+          <p:nvPr/>
+        </p:nvCxnSpPr>
+        <p:spPr>
+          <a:xfrm flipH="1">
+            <a:off x="6096636" y="1730968"/>
+            <a:ext cx="543396" cy="548797"/>
+          </a:xfrm>
+          <a:prstGeom prst="line">
+            <a:avLst/>
+          </a:prstGeom>
+          <a:ln w="15875" cap="flat" cmpd="sng" algn="ctr">
+            <a:solidFill>
+              <a:schemeClr val="bg1">
+                <a:lumMod val="75000"/>
+              </a:schemeClr>
+            </a:solidFill>
+            <a:prstDash val="dash"/>
+            <a:round/>
+            <a:headEnd type="none" w="med" len="med"/>
+            <a:tailEnd type="none" w="med" len="med"/>
+          </a:ln>
+        </p:spPr>
+        <p:style>
+          <a:lnRef idx="0">
+            <a:scrgbClr r="0" g="0" b="0"/>
+          </a:lnRef>
+          <a:fillRef idx="0">
+            <a:scrgbClr r="0" g="0" b="0"/>
+          </a:fillRef>
+          <a:effectRef idx="0">
+            <a:scrgbClr r="0" g="0" b="0"/>
+          </a:effectRef>
+          <a:fontRef idx="minor">
+            <a:schemeClr val="tx1"/>
+          </a:fontRef>
+        </p:style>
+      </p:cxnSp>
+      <p:sp>
+        <p:nvSpPr>
+          <p:cNvPr id="50" name="文本框 49">
+            <a:extLst>
+              <a:ext uri="{FF2B5EF4-FFF2-40B4-BE49-F238E27FC236}">
+                <a16:creationId xmlns:a16="http://schemas.microsoft.com/office/drawing/2014/main" id="{C1EB85B0-4D6D-4D91-A91A-09CDA81C04E0}"/>
+              </a:ext>
+            </a:extLst>
+          </p:cNvPr>
+          <p:cNvSpPr txBox="1"/>
+          <p:nvPr/>
+        </p:nvSpPr>
+        <p:spPr>
+          <a:xfrm>
+            <a:off x="3572522" y="297602"/>
+            <a:ext cx="1133644" cy="400110"/>
+          </a:xfrm>
+          <a:prstGeom prst="rect">
+            <a:avLst/>
+          </a:prstGeom>
+          <a:noFill/>
+        </p:spPr>
+        <p:txBody>
+          <a:bodyPr wrap="none" rtlCol="0">
+            <a:spAutoFit/>
+          </a:bodyPr>
+          <a:lstStyle/>
+          <a:p>
+            <a:r>
+              <a:rPr lang="en-US" sz="2000" b="1">
+                <a:solidFill>
+                  <a:schemeClr val="bg1">
+                    <a:lumMod val="75000"/>
+                  </a:schemeClr>
+                </a:solidFill>
+              </a:rPr>
+              <a:t>ICM </a:t>
+            </a:r>
+            <a:r>
+              <a:rPr lang="zh-CN" altLang="en-US" b="1">
+                <a:solidFill>
+                  <a:schemeClr val="bg1">
+                    <a:lumMod val="75000"/>
+                  </a:schemeClr>
+                </a:solidFill>
+              </a:rPr>
+              <a:t>地址</a:t>
+            </a:r>
+            <a:endParaRPr lang="en-US" sz="2000" b="1">
+              <a:solidFill>
+                <a:schemeClr val="bg1">
+                  <a:lumMod val="75000"/>
+                </a:schemeClr>
+              </a:solidFill>
+            </a:endParaRPr>
+          </a:p>
+        </p:txBody>
+      </p:sp>
+      <p:sp>
+        <p:nvSpPr>
+          <p:cNvPr id="57" name="矩形 56">
+            <a:extLst>
+              <a:ext uri="{FF2B5EF4-FFF2-40B4-BE49-F238E27FC236}">
+                <a16:creationId xmlns:a16="http://schemas.microsoft.com/office/drawing/2014/main" id="{CDDB2EC9-1773-4C9C-8322-E1903F66D0B7}"/>
+              </a:ext>
+            </a:extLst>
+          </p:cNvPr>
+          <p:cNvSpPr/>
+          <p:nvPr/>
+        </p:nvSpPr>
+        <p:spPr>
+          <a:xfrm>
+            <a:off x="6238091" y="1330858"/>
+            <a:ext cx="401941" cy="407407"/>
+          </a:xfrm>
+          <a:prstGeom prst="rect">
+            <a:avLst/>
+          </a:prstGeom>
+          <a:solidFill>
+            <a:schemeClr val="tx1"/>
+          </a:solidFill>
+          <a:ln>
+            <a:noFill/>
+          </a:ln>
+        </p:spPr>
+        <p:style>
+          <a:lnRef idx="2">
+            <a:schemeClr val="accent3">
+              <a:shade val="50000"/>
+            </a:schemeClr>
+          </a:lnRef>
+          <a:fillRef idx="1">
+            <a:schemeClr val="accent3"/>
+          </a:fillRef>
+          <a:effectRef idx="0">
+            <a:schemeClr val="accent3"/>
+          </a:effectRef>
+          <a:fontRef idx="minor">
+            <a:schemeClr val="lt1"/>
+          </a:fontRef>
+        </p:style>
+        <p:txBody>
+          <a:bodyPr rtlCol="0" anchor="ctr"/>
+          <a:lstStyle/>
+          <a:p>
+            <a:pPr algn="ctr"/>
+            <a:endParaRPr lang="en-US"/>
+          </a:p>
+        </p:txBody>
+      </p:sp>
+      <p:sp>
+        <p:nvSpPr>
+          <p:cNvPr id="58" name="矩形 57">
+            <a:extLst>
+              <a:ext uri="{FF2B5EF4-FFF2-40B4-BE49-F238E27FC236}">
+                <a16:creationId xmlns:a16="http://schemas.microsoft.com/office/drawing/2014/main" id="{9B455BB3-D5C9-4687-B8DB-22B88771C6D1}"/>
+              </a:ext>
+            </a:extLst>
+          </p:cNvPr>
+          <p:cNvSpPr/>
+          <p:nvPr/>
+        </p:nvSpPr>
+        <p:spPr>
+          <a:xfrm>
+            <a:off x="5658483" y="1330859"/>
+            <a:ext cx="401941" cy="407407"/>
+          </a:xfrm>
+          <a:prstGeom prst="rect">
+            <a:avLst/>
+          </a:prstGeom>
+          <a:ln>
+            <a:noFill/>
+          </a:ln>
+        </p:spPr>
+        <p:style>
+          <a:lnRef idx="2">
+            <a:schemeClr val="accent3">
+              <a:shade val="50000"/>
+            </a:schemeClr>
+          </a:lnRef>
+          <a:fillRef idx="1">
+            <a:schemeClr val="accent3"/>
+          </a:fillRef>
+          <a:effectRef idx="0">
+            <a:schemeClr val="accent3"/>
+          </a:effectRef>
+          <a:fontRef idx="minor">
+            <a:schemeClr val="lt1"/>
+          </a:fontRef>
+        </p:style>
+        <p:txBody>
+          <a:bodyPr rtlCol="0" anchor="ctr"/>
+          <a:lstStyle/>
+          <a:p>
+            <a:pPr algn="ctr"/>
+            <a:endParaRPr lang="en-US"/>
+          </a:p>
+        </p:txBody>
+      </p:sp>
+      <p:sp>
+        <p:nvSpPr>
+          <p:cNvPr id="60" name="矩形 59">
+            <a:extLst>
+              <a:ext uri="{FF2B5EF4-FFF2-40B4-BE49-F238E27FC236}">
+                <a16:creationId xmlns:a16="http://schemas.microsoft.com/office/drawing/2014/main" id="{AB48BB11-EE7C-4317-82F3-937479420452}"/>
+              </a:ext>
+            </a:extLst>
+          </p:cNvPr>
+          <p:cNvSpPr/>
+          <p:nvPr/>
+        </p:nvSpPr>
+        <p:spPr>
+          <a:xfrm rot="5400000">
+            <a:off x="5492477" y="1409871"/>
+            <a:ext cx="198448" cy="249381"/>
+          </a:xfrm>
+          <a:prstGeom prst="rect">
+            <a:avLst/>
+          </a:prstGeom>
+          <a:ln>
+            <a:noFill/>
+          </a:ln>
+        </p:spPr>
+        <p:style>
+          <a:lnRef idx="2">
+            <a:schemeClr val="accent3">
+              <a:shade val="50000"/>
+            </a:schemeClr>
+          </a:lnRef>
+          <a:fillRef idx="1">
+            <a:schemeClr val="accent3"/>
+          </a:fillRef>
+          <a:effectRef idx="0">
+            <a:schemeClr val="accent3"/>
+          </a:effectRef>
+          <a:fontRef idx="minor">
+            <a:schemeClr val="lt1"/>
+          </a:fontRef>
+        </p:style>
+        <p:txBody>
+          <a:bodyPr rtlCol="0" anchor="ctr"/>
+          <a:lstStyle/>
+          <a:p>
+            <a:pPr algn="ctr"/>
+            <a:endParaRPr lang="en-US"/>
+          </a:p>
+        </p:txBody>
+      </p:sp>
+      <p:sp>
+        <p:nvSpPr>
+          <p:cNvPr id="63" name="矩形 62">
+            <a:extLst>
+              <a:ext uri="{FF2B5EF4-FFF2-40B4-BE49-F238E27FC236}">
+                <a16:creationId xmlns:a16="http://schemas.microsoft.com/office/drawing/2014/main" id="{0FC1E562-F062-4F89-B557-DBF5E98F9D9B}"/>
+              </a:ext>
+            </a:extLst>
+          </p:cNvPr>
+          <p:cNvSpPr/>
+          <p:nvPr/>
+        </p:nvSpPr>
+        <p:spPr>
+          <a:xfrm>
+            <a:off x="5085112" y="1330858"/>
+            <a:ext cx="401941" cy="407407"/>
+          </a:xfrm>
+          <a:prstGeom prst="rect">
+            <a:avLst/>
+          </a:prstGeom>
+          <a:solidFill>
+            <a:srgbClr val="C00000"/>
+          </a:solidFill>
+          <a:ln>
+            <a:noFill/>
+          </a:ln>
+        </p:spPr>
+        <p:style>
+          <a:lnRef idx="2">
+            <a:schemeClr val="accent3">
+              <a:shade val="50000"/>
+            </a:schemeClr>
+          </a:lnRef>
+          <a:fillRef idx="1">
+            <a:schemeClr val="accent3"/>
+          </a:fillRef>
+          <a:effectRef idx="0">
+            <a:schemeClr val="accent3"/>
+          </a:effectRef>
+          <a:fontRef idx="minor">
+            <a:schemeClr val="lt1"/>
+          </a:fontRef>
+        </p:style>
+        <p:txBody>
+          <a:bodyPr rtlCol="0" anchor="ctr"/>
+          <a:lstStyle/>
+          <a:p>
+            <a:pPr algn="ctr"/>
+            <a:endParaRPr lang="en-US"/>
+          </a:p>
+        </p:txBody>
+      </p:sp>
+      <p:sp>
+        <p:nvSpPr>
+          <p:cNvPr id="66" name="文本框 65">
+            <a:extLst>
+              <a:ext uri="{FF2B5EF4-FFF2-40B4-BE49-F238E27FC236}">
+                <a16:creationId xmlns:a16="http://schemas.microsoft.com/office/drawing/2014/main" id="{3D8D75AE-75CD-45C4-A470-B4807554FE75}"/>
+              </a:ext>
+            </a:extLst>
+          </p:cNvPr>
+          <p:cNvSpPr txBox="1"/>
+          <p:nvPr/>
+        </p:nvSpPr>
+        <p:spPr>
+          <a:xfrm>
+            <a:off x="6759123" y="1330858"/>
+            <a:ext cx="1610957" cy="400110"/>
+          </a:xfrm>
+          <a:prstGeom prst="rect">
+            <a:avLst/>
+          </a:prstGeom>
+          <a:noFill/>
+        </p:spPr>
+        <p:txBody>
+          <a:bodyPr wrap="square" rtlCol="0">
+            <a:spAutoFit/>
+          </a:bodyPr>
+          <a:lstStyle/>
+          <a:p>
+            <a:r>
+              <a:rPr lang="en-US" sz="2000" b="1">
+                <a:solidFill>
+                  <a:schemeClr val="bg1">
+                    <a:lumMod val="75000"/>
+                  </a:schemeClr>
+                </a:solidFill>
+              </a:rPr>
+              <a:t>0x69 </a:t>
+            </a:r>
+            <a:r>
+              <a:rPr lang="zh-CN" altLang="en-US" b="1">
+                <a:solidFill>
+                  <a:schemeClr val="bg1">
+                    <a:lumMod val="75000"/>
+                  </a:schemeClr>
+                </a:solidFill>
+              </a:rPr>
+              <a:t>默认</a:t>
+            </a:r>
+            <a:endParaRPr lang="en-US" sz="2000" b="1">
+              <a:solidFill>
+                <a:schemeClr val="bg1">
+                  <a:lumMod val="75000"/>
+                </a:schemeClr>
+              </a:solidFill>
+            </a:endParaRPr>
+          </a:p>
+        </p:txBody>
+      </p:sp>
+      <p:sp>
+        <p:nvSpPr>
+          <p:cNvPr id="32" name="矩形 31">
+            <a:extLst>
+              <a:ext uri="{FF2B5EF4-FFF2-40B4-BE49-F238E27FC236}">
+                <a16:creationId xmlns:a16="http://schemas.microsoft.com/office/drawing/2014/main" id="{C4223CC2-94EF-4FC8-8429-07B8F8447587}"/>
+              </a:ext>
+            </a:extLst>
+          </p:cNvPr>
+          <p:cNvSpPr/>
+          <p:nvPr/>
+        </p:nvSpPr>
+        <p:spPr>
+          <a:xfrm>
+            <a:off x="6238091" y="697712"/>
+            <a:ext cx="401941" cy="407407"/>
+          </a:xfrm>
+          <a:prstGeom prst="rect">
+            <a:avLst/>
+          </a:prstGeom>
+          <a:solidFill>
+            <a:schemeClr val="tx1"/>
+          </a:solidFill>
+          <a:ln>
+            <a:noFill/>
+          </a:ln>
+        </p:spPr>
+        <p:style>
+          <a:lnRef idx="2">
+            <a:schemeClr val="accent3">
+              <a:shade val="50000"/>
+            </a:schemeClr>
+          </a:lnRef>
+          <a:fillRef idx="1">
+            <a:schemeClr val="accent3"/>
+          </a:fillRef>
+          <a:effectRef idx="0">
+            <a:schemeClr val="accent3"/>
+          </a:effectRef>
+          <a:fontRef idx="minor">
+            <a:schemeClr val="lt1"/>
+          </a:fontRef>
+        </p:style>
+        <p:txBody>
+          <a:bodyPr rtlCol="0" anchor="ctr"/>
+          <a:lstStyle/>
+          <a:p>
+            <a:pPr algn="ctr"/>
+            <a:endParaRPr lang="en-US"/>
+          </a:p>
+        </p:txBody>
+      </p:sp>
+      <p:sp>
+        <p:nvSpPr>
+          <p:cNvPr id="33" name="矩形 32">
+            <a:extLst>
+              <a:ext uri="{FF2B5EF4-FFF2-40B4-BE49-F238E27FC236}">
+                <a16:creationId xmlns:a16="http://schemas.microsoft.com/office/drawing/2014/main" id="{1CA11075-D2F3-4879-8223-2AEE1772D200}"/>
+              </a:ext>
+            </a:extLst>
+          </p:cNvPr>
+          <p:cNvSpPr/>
+          <p:nvPr/>
+        </p:nvSpPr>
+        <p:spPr>
+          <a:xfrm>
+            <a:off x="5658483" y="697713"/>
+            <a:ext cx="401941" cy="407407"/>
+          </a:xfrm>
+          <a:prstGeom prst="rect">
+            <a:avLst/>
+          </a:prstGeom>
+          <a:ln>
+            <a:noFill/>
+          </a:ln>
+        </p:spPr>
+        <p:style>
+          <a:lnRef idx="2">
+            <a:schemeClr val="accent3">
+              <a:shade val="50000"/>
+            </a:schemeClr>
+          </a:lnRef>
+          <a:fillRef idx="1">
+            <a:schemeClr val="accent3"/>
+          </a:fillRef>
+          <a:effectRef idx="0">
+            <a:schemeClr val="accent3"/>
+          </a:effectRef>
+          <a:fontRef idx="minor">
+            <a:schemeClr val="lt1"/>
+          </a:fontRef>
+        </p:style>
+        <p:txBody>
+          <a:bodyPr rtlCol="0" anchor="ctr"/>
+          <a:lstStyle/>
+          <a:p>
+            <a:pPr algn="ctr"/>
+            <a:endParaRPr lang="en-US"/>
+          </a:p>
+        </p:txBody>
+      </p:sp>
+      <p:sp>
+        <p:nvSpPr>
+          <p:cNvPr id="37" name="矩形 36">
+            <a:extLst>
+              <a:ext uri="{FF2B5EF4-FFF2-40B4-BE49-F238E27FC236}">
+                <a16:creationId xmlns:a16="http://schemas.microsoft.com/office/drawing/2014/main" id="{B15D9D48-8BC5-49AE-AB96-65A4F06398DE}"/>
+              </a:ext>
+            </a:extLst>
+          </p:cNvPr>
+          <p:cNvSpPr/>
+          <p:nvPr/>
+        </p:nvSpPr>
+        <p:spPr>
+          <a:xfrm>
+            <a:off x="5085112" y="697712"/>
+            <a:ext cx="401941" cy="407407"/>
+          </a:xfrm>
+          <a:prstGeom prst="rect">
+            <a:avLst/>
+          </a:prstGeom>
+          <a:solidFill>
+            <a:srgbClr val="C00000"/>
+          </a:solidFill>
+          <a:ln>
+            <a:noFill/>
+          </a:ln>
+        </p:spPr>
+        <p:style>
+          <a:lnRef idx="2">
+            <a:schemeClr val="accent3">
+              <a:shade val="50000"/>
+            </a:schemeClr>
+          </a:lnRef>
+          <a:fillRef idx="1">
+            <a:schemeClr val="accent3"/>
+          </a:fillRef>
+          <a:effectRef idx="0">
+            <a:schemeClr val="accent3"/>
+          </a:effectRef>
+          <a:fontRef idx="minor">
+            <a:schemeClr val="lt1"/>
+          </a:fontRef>
+        </p:style>
+        <p:txBody>
+          <a:bodyPr rtlCol="0" anchor="ctr"/>
+          <a:lstStyle/>
+          <a:p>
+            <a:pPr algn="ctr"/>
+            <a:endParaRPr lang="en-US"/>
+          </a:p>
+        </p:txBody>
+      </p:sp>
+      <p:sp>
+        <p:nvSpPr>
+          <p:cNvPr id="38" name="文本框 37">
+            <a:extLst>
+              <a:ext uri="{FF2B5EF4-FFF2-40B4-BE49-F238E27FC236}">
+                <a16:creationId xmlns:a16="http://schemas.microsoft.com/office/drawing/2014/main" id="{CEEF7DCE-CA55-4A30-A7B5-74D49D650A01}"/>
+              </a:ext>
+            </a:extLst>
+          </p:cNvPr>
+          <p:cNvSpPr txBox="1"/>
+          <p:nvPr/>
+        </p:nvSpPr>
+        <p:spPr>
+          <a:xfrm>
+            <a:off x="6768934" y="677038"/>
+            <a:ext cx="1610957" cy="400110"/>
+          </a:xfrm>
+          <a:prstGeom prst="rect">
+            <a:avLst/>
+          </a:prstGeom>
+          <a:noFill/>
+        </p:spPr>
+        <p:txBody>
+          <a:bodyPr wrap="square" rtlCol="0">
+            <a:spAutoFit/>
+          </a:bodyPr>
+          <a:lstStyle/>
+          <a:p>
+            <a:r>
+              <a:rPr lang="en-US" sz="2000" b="1">
+                <a:solidFill>
+                  <a:schemeClr val="bg1">
+                    <a:lumMod val="75000"/>
+                  </a:schemeClr>
+                </a:solidFill>
+              </a:rPr>
+              <a:t>0x68 </a:t>
+            </a:r>
+          </a:p>
+        </p:txBody>
+      </p:sp>
+      <p:pic>
+        <p:nvPicPr>
+          <p:cNvPr id="40" name="图片 39">
+            <a:extLst>
+              <a:ext uri="{FF2B5EF4-FFF2-40B4-BE49-F238E27FC236}">
+                <a16:creationId xmlns:a16="http://schemas.microsoft.com/office/drawing/2014/main" id="{DEBC0D38-F67D-40E6-B3A9-FA58906D3AB6}"/>
+              </a:ext>
+            </a:extLst>
+          </p:cNvPr>
+          <p:cNvPicPr>
+            <a:picLocks noChangeAspect="1"/>
+          </p:cNvPicPr>
+          <p:nvPr/>
+        </p:nvPicPr>
+        <p:blipFill>
+          <a:blip r:embed="rId3">
+            <a:extLst>
+              <a:ext uri="{28A0092B-C50C-407E-A947-70E740481C1C}">
+                <a14:useLocalDpi xmlns:a14="http://schemas.microsoft.com/office/drawing/2010/main" val="0"/>
+              </a:ext>
+            </a:extLst>
+          </a:blip>
+          <a:stretch>
+            <a:fillRect/>
+          </a:stretch>
+        </p:blipFill>
+        <p:spPr>
+          <a:xfrm>
+            <a:off x="2490830" y="2279765"/>
+            <a:ext cx="472059" cy="472059"/>
+          </a:xfrm>
+          <a:prstGeom prst="rect">
+            <a:avLst/>
+          </a:prstGeom>
+        </p:spPr>
+      </p:pic>
+      <p:pic>
+        <p:nvPicPr>
+          <p:cNvPr id="41" name="图片 40">
+            <a:extLst>
+              <a:ext uri="{FF2B5EF4-FFF2-40B4-BE49-F238E27FC236}">
+                <a16:creationId xmlns:a16="http://schemas.microsoft.com/office/drawing/2014/main" id="{F5687E97-5AEA-478C-9267-382768CA5EF3}"/>
+              </a:ext>
+            </a:extLst>
+          </p:cNvPr>
+          <p:cNvPicPr>
+            <a:picLocks noChangeAspect="1"/>
+          </p:cNvPicPr>
+          <p:nvPr/>
+        </p:nvPicPr>
+        <p:blipFill>
+          <a:blip r:embed="rId4">
+            <a:extLst>
+              <a:ext uri="{28A0092B-C50C-407E-A947-70E740481C1C}">
+                <a14:useLocalDpi xmlns:a14="http://schemas.microsoft.com/office/drawing/2010/main" val="0"/>
+              </a:ext>
+            </a:extLst>
+          </a:blip>
+          <a:stretch>
+            <a:fillRect/>
+          </a:stretch>
+        </p:blipFill>
+        <p:spPr>
+          <a:xfrm>
+            <a:off x="2490830" y="2760879"/>
+            <a:ext cx="472059" cy="472059"/>
+          </a:xfrm>
+          <a:prstGeom prst="rect">
+            <a:avLst/>
+          </a:prstGeom>
+        </p:spPr>
+      </p:pic>
+      <p:pic>
+        <p:nvPicPr>
+          <p:cNvPr id="42" name="图片 41">
+            <a:extLst>
+              <a:ext uri="{FF2B5EF4-FFF2-40B4-BE49-F238E27FC236}">
+                <a16:creationId xmlns:a16="http://schemas.microsoft.com/office/drawing/2014/main" id="{F5AD0279-4946-404A-B222-05DDF6172070}"/>
+              </a:ext>
+            </a:extLst>
+          </p:cNvPr>
+          <p:cNvPicPr>
+            <a:picLocks noChangeAspect="1"/>
+          </p:cNvPicPr>
+          <p:nvPr/>
+        </p:nvPicPr>
+        <p:blipFill>
+          <a:blip r:embed="rId5">
+            <a:extLst>
+              <a:ext uri="{28A0092B-C50C-407E-A947-70E740481C1C}">
+                <a14:useLocalDpi xmlns:a14="http://schemas.microsoft.com/office/drawing/2010/main" val="0"/>
+              </a:ext>
+            </a:extLst>
+          </a:blip>
+          <a:stretch>
+            <a:fillRect/>
+          </a:stretch>
+        </p:blipFill>
+        <p:spPr>
+          <a:xfrm>
+            <a:off x="2490830" y="3529772"/>
+            <a:ext cx="472059" cy="472059"/>
+          </a:xfrm>
+          <a:prstGeom prst="rect">
+            <a:avLst/>
+          </a:prstGeom>
+        </p:spPr>
+      </p:pic>
+      <p:pic>
+        <p:nvPicPr>
+          <p:cNvPr id="43" name="图片 42">
+            <a:extLst>
+              <a:ext uri="{FF2B5EF4-FFF2-40B4-BE49-F238E27FC236}">
+                <a16:creationId xmlns:a16="http://schemas.microsoft.com/office/drawing/2014/main" id="{E34A3E79-3EAA-426A-928E-90D041F936C8}"/>
+              </a:ext>
+            </a:extLst>
+          </p:cNvPr>
+          <p:cNvPicPr>
+            <a:picLocks noChangeAspect="1"/>
+          </p:cNvPicPr>
+          <p:nvPr/>
+        </p:nvPicPr>
+        <p:blipFill>
+          <a:blip r:embed="rId6">
+            <a:extLst>
+              <a:ext uri="{28A0092B-C50C-407E-A947-70E740481C1C}">
+                <a14:useLocalDpi xmlns:a14="http://schemas.microsoft.com/office/drawing/2010/main" val="0"/>
+              </a:ext>
+            </a:extLst>
+          </a:blip>
+          <a:stretch>
+            <a:fillRect/>
+          </a:stretch>
+        </p:blipFill>
+        <p:spPr>
+          <a:xfrm>
+            <a:off x="2490830" y="4010886"/>
+            <a:ext cx="472059" cy="472059"/>
+          </a:xfrm>
+          <a:prstGeom prst="rect">
+            <a:avLst/>
+          </a:prstGeom>
+        </p:spPr>
+      </p:pic>
+      <p:cxnSp>
+        <p:nvCxnSpPr>
+          <p:cNvPr id="64" name="直接连接符 63">
+            <a:extLst>
+              <a:ext uri="{FF2B5EF4-FFF2-40B4-BE49-F238E27FC236}">
+                <a16:creationId xmlns:a16="http://schemas.microsoft.com/office/drawing/2014/main" id="{585E62DC-3A41-4022-81EE-AF9616CC95EA}"/>
+              </a:ext>
+            </a:extLst>
+          </p:cNvPr>
+          <p:cNvCxnSpPr>
+            <a:cxnSpLocks/>
+          </p:cNvCxnSpPr>
+          <p:nvPr/>
+        </p:nvCxnSpPr>
+        <p:spPr>
+          <a:xfrm>
+            <a:off x="2962889" y="3840317"/>
+            <a:ext cx="778863" cy="1"/>
+          </a:xfrm>
+          <a:prstGeom prst="line">
+            <a:avLst/>
+          </a:prstGeom>
+          <a:ln w="15875" cap="flat" cmpd="sng" algn="ctr">
+            <a:solidFill>
+              <a:schemeClr val="bg1">
+                <a:lumMod val="75000"/>
+              </a:schemeClr>
+            </a:solidFill>
+            <a:prstDash val="dash"/>
+            <a:round/>
+            <a:headEnd type="none" w="med" len="med"/>
+            <a:tailEnd type="none" w="med" len="med"/>
+          </a:ln>
+        </p:spPr>
+        <p:style>
+          <a:lnRef idx="0">
+            <a:scrgbClr r="0" g="0" b="0"/>
+          </a:lnRef>
+          <a:fillRef idx="0">
+            <a:scrgbClr r="0" g="0" b="0"/>
+          </a:fillRef>
+          <a:effectRef idx="0">
+            <a:scrgbClr r="0" g="0" b="0"/>
+          </a:effectRef>
+          <a:fontRef idx="minor">
+            <a:schemeClr val="tx1"/>
+          </a:fontRef>
+        </p:style>
+      </p:cxnSp>
+      <p:cxnSp>
+        <p:nvCxnSpPr>
+          <p:cNvPr id="65" name="直接连接符 64">
+            <a:extLst>
+              <a:ext uri="{FF2B5EF4-FFF2-40B4-BE49-F238E27FC236}">
+                <a16:creationId xmlns:a16="http://schemas.microsoft.com/office/drawing/2014/main" id="{0FA13DBF-0DAD-4585-B83B-C53F9AC7A421}"/>
+              </a:ext>
+            </a:extLst>
+          </p:cNvPr>
+          <p:cNvCxnSpPr>
+            <a:cxnSpLocks/>
+          </p:cNvCxnSpPr>
+          <p:nvPr/>
+        </p:nvCxnSpPr>
+        <p:spPr>
+          <a:xfrm>
+            <a:off x="2881695" y="4110412"/>
+            <a:ext cx="851003" cy="0"/>
+          </a:xfrm>
+          <a:prstGeom prst="line">
+            <a:avLst/>
+          </a:prstGeom>
+          <a:ln w="15875" cap="flat" cmpd="sng" algn="ctr">
+            <a:solidFill>
+              <a:schemeClr val="bg1">
+                <a:lumMod val="75000"/>
+              </a:schemeClr>
+            </a:solidFill>
+            <a:prstDash val="dash"/>
+            <a:round/>
+            <a:headEnd type="none" w="med" len="med"/>
+            <a:tailEnd type="none" w="med" len="med"/>
+          </a:ln>
+        </p:spPr>
+        <p:style>
+          <a:lnRef idx="0">
+            <a:scrgbClr r="0" g="0" b="0"/>
+          </a:lnRef>
+          <a:fillRef idx="0">
+            <a:scrgbClr r="0" g="0" b="0"/>
+          </a:fillRef>
+          <a:effectRef idx="0">
+            <a:scrgbClr r="0" g="0" b="0"/>
+          </a:effectRef>
+          <a:fontRef idx="minor">
+            <a:schemeClr val="tx1"/>
+          </a:fontRef>
+        </p:style>
+      </p:cxnSp>
+      <p:sp>
+        <p:nvSpPr>
+          <p:cNvPr id="68" name="椭圆 67">
+            <a:extLst>
+              <a:ext uri="{FF2B5EF4-FFF2-40B4-BE49-F238E27FC236}">
+                <a16:creationId xmlns:a16="http://schemas.microsoft.com/office/drawing/2014/main" id="{9CF846C2-775A-4D2B-AD67-449019124C1F}"/>
+              </a:ext>
+            </a:extLst>
+          </p:cNvPr>
+          <p:cNvSpPr>
+            <a:spLocks noChangeAspect="1"/>
+          </p:cNvSpPr>
+          <p:nvPr/>
+        </p:nvSpPr>
+        <p:spPr>
+          <a:xfrm>
+            <a:off x="3681136" y="2586153"/>
+            <a:ext cx="103124" cy="103124"/>
+          </a:xfrm>
+          <a:prstGeom prst="ellipse">
+            <a:avLst/>
+          </a:prstGeom>
+          <a:solidFill>
+            <a:srgbClr val="FFC000"/>
+          </a:solidFill>
+          <a:ln w="25400">
+            <a:solidFill>
+              <a:schemeClr val="bg1"/>
+            </a:solidFill>
+          </a:ln>
+        </p:spPr>
+        <p:style>
+          <a:lnRef idx="2">
+            <a:schemeClr val="accent1">
+              <a:shade val="50000"/>
+            </a:schemeClr>
+          </a:lnRef>
+          <a:fillRef idx="1">
+            <a:schemeClr val="accent1"/>
+          </a:fillRef>
+          <a:effectRef idx="0">
+            <a:schemeClr val="accent1"/>
+          </a:effectRef>
+          <a:fontRef idx="minor">
+            <a:schemeClr val="lt1"/>
+          </a:fontRef>
+        </p:style>
+        <p:txBody>
+          <a:bodyPr rtlCol="0" anchor="ctr"/>
+          <a:lstStyle/>
+          <a:p>
+            <a:pPr algn="ctr"/>
+            <a:endParaRPr lang="en-US"/>
+          </a:p>
+        </p:txBody>
+      </p:sp>
+      <p:sp>
+        <p:nvSpPr>
+          <p:cNvPr id="69" name="椭圆 68">
+            <a:extLst>
+              <a:ext uri="{FF2B5EF4-FFF2-40B4-BE49-F238E27FC236}">
+                <a16:creationId xmlns:a16="http://schemas.microsoft.com/office/drawing/2014/main" id="{DFEC5184-9B15-4F18-80CA-E158D5CDCC7E}"/>
+              </a:ext>
+            </a:extLst>
+          </p:cNvPr>
+          <p:cNvSpPr>
+            <a:spLocks noChangeAspect="1"/>
+          </p:cNvSpPr>
+          <p:nvPr/>
+        </p:nvSpPr>
+        <p:spPr>
+          <a:xfrm>
+            <a:off x="3681136" y="2890953"/>
+            <a:ext cx="103124" cy="103124"/>
+          </a:xfrm>
+          <a:prstGeom prst="ellipse">
+            <a:avLst/>
+          </a:prstGeom>
+          <a:solidFill>
+            <a:srgbClr val="FFC000"/>
+          </a:solidFill>
+          <a:ln w="25400">
+            <a:solidFill>
+              <a:schemeClr val="bg1"/>
+            </a:solidFill>
+          </a:ln>
+        </p:spPr>
+        <p:style>
+          <a:lnRef idx="2">
+            <a:schemeClr val="accent1">
+              <a:shade val="50000"/>
+            </a:schemeClr>
+          </a:lnRef>
+          <a:fillRef idx="1">
+            <a:schemeClr val="accent1"/>
+          </a:fillRef>
+          <a:effectRef idx="0">
+            <a:schemeClr val="accent1"/>
+          </a:effectRef>
+          <a:fontRef idx="minor">
+            <a:schemeClr val="lt1"/>
+          </a:fontRef>
+        </p:style>
+        <p:txBody>
+          <a:bodyPr rtlCol="0" anchor="ctr"/>
+          <a:lstStyle/>
+          <a:p>
+            <a:pPr algn="ctr"/>
+            <a:endParaRPr lang="en-US"/>
+          </a:p>
+        </p:txBody>
+      </p:sp>
+      <p:sp>
+        <p:nvSpPr>
+          <p:cNvPr id="70" name="椭圆 69">
+            <a:extLst>
+              <a:ext uri="{FF2B5EF4-FFF2-40B4-BE49-F238E27FC236}">
+                <a16:creationId xmlns:a16="http://schemas.microsoft.com/office/drawing/2014/main" id="{0C6C5950-CCAA-4F4F-8CC9-73ABFC2E9B20}"/>
+              </a:ext>
+            </a:extLst>
+          </p:cNvPr>
+          <p:cNvSpPr>
+            <a:spLocks noChangeAspect="1"/>
+          </p:cNvSpPr>
+          <p:nvPr/>
+        </p:nvSpPr>
+        <p:spPr>
+          <a:xfrm>
+            <a:off x="3687148" y="3759688"/>
+            <a:ext cx="103124" cy="103124"/>
+          </a:xfrm>
+          <a:prstGeom prst="ellipse">
+            <a:avLst/>
+          </a:prstGeom>
+          <a:solidFill>
+            <a:srgbClr val="FFC000"/>
+          </a:solidFill>
+          <a:ln w="25400">
+            <a:solidFill>
+              <a:schemeClr val="bg1"/>
+            </a:solidFill>
+          </a:ln>
+        </p:spPr>
+        <p:style>
+          <a:lnRef idx="2">
+            <a:schemeClr val="accent1">
+              <a:shade val="50000"/>
+            </a:schemeClr>
+          </a:lnRef>
+          <a:fillRef idx="1">
+            <a:schemeClr val="accent1"/>
+          </a:fillRef>
+          <a:effectRef idx="0">
+            <a:schemeClr val="accent1"/>
+          </a:effectRef>
+          <a:fontRef idx="minor">
+            <a:schemeClr val="lt1"/>
+          </a:fontRef>
+        </p:style>
+        <p:txBody>
+          <a:bodyPr rtlCol="0" anchor="ctr"/>
+          <a:lstStyle/>
+          <a:p>
+            <a:pPr algn="ctr"/>
+            <a:endParaRPr lang="en-US"/>
+          </a:p>
+        </p:txBody>
+      </p:sp>
+      <p:sp>
+        <p:nvSpPr>
+          <p:cNvPr id="71" name="椭圆 70">
+            <a:extLst>
+              <a:ext uri="{FF2B5EF4-FFF2-40B4-BE49-F238E27FC236}">
+                <a16:creationId xmlns:a16="http://schemas.microsoft.com/office/drawing/2014/main" id="{1F80BF7D-236E-484D-A79B-0B3010CA911D}"/>
+              </a:ext>
+            </a:extLst>
+          </p:cNvPr>
+          <p:cNvSpPr>
+            <a:spLocks noChangeAspect="1"/>
+          </p:cNvSpPr>
+          <p:nvPr/>
+        </p:nvSpPr>
+        <p:spPr>
+          <a:xfrm>
+            <a:off x="3690189" y="4074653"/>
+            <a:ext cx="103124" cy="103124"/>
+          </a:xfrm>
+          <a:prstGeom prst="ellipse">
+            <a:avLst/>
+          </a:prstGeom>
+          <a:solidFill>
+            <a:srgbClr val="FFC000"/>
+          </a:solidFill>
+          <a:ln w="25400">
+            <a:solidFill>
+              <a:schemeClr val="bg1"/>
+            </a:solidFill>
+          </a:ln>
+        </p:spPr>
+        <p:style>
+          <a:lnRef idx="2">
+            <a:schemeClr val="accent1">
+              <a:shade val="50000"/>
+            </a:schemeClr>
+          </a:lnRef>
+          <a:fillRef idx="1">
+            <a:schemeClr val="accent1"/>
+          </a:fillRef>
+          <a:effectRef idx="0">
+            <a:schemeClr val="accent1"/>
+          </a:effectRef>
+          <a:fontRef idx="minor">
+            <a:schemeClr val="lt1"/>
+          </a:fontRef>
+        </p:style>
+        <p:txBody>
+          <a:bodyPr rtlCol="0" anchor="ctr"/>
+          <a:lstStyle/>
+          <a:p>
+            <a:pPr algn="ctr"/>
+            <a:endParaRPr lang="en-US"/>
+          </a:p>
+        </p:txBody>
+      </p:sp>
+      <p:pic>
+        <p:nvPicPr>
+          <p:cNvPr id="72" name="图片 71">
+            <a:extLst>
+              <a:ext uri="{FF2B5EF4-FFF2-40B4-BE49-F238E27FC236}">
+                <a16:creationId xmlns:a16="http://schemas.microsoft.com/office/drawing/2014/main" id="{3649F04D-B02A-4500-A902-58B79FBC2B8B}"/>
+              </a:ext>
+            </a:extLst>
+          </p:cNvPr>
+          <p:cNvPicPr>
+            <a:picLocks noChangeAspect="1"/>
+          </p:cNvPicPr>
+          <p:nvPr/>
+        </p:nvPicPr>
+        <p:blipFill>
+          <a:blip r:embed="rId3">
+            <a:extLst>
+              <a:ext uri="{28A0092B-C50C-407E-A947-70E740481C1C}">
+                <a14:useLocalDpi xmlns:a14="http://schemas.microsoft.com/office/drawing/2010/main" val="0"/>
+              </a:ext>
+            </a:extLst>
+          </a:blip>
+          <a:stretch>
+            <a:fillRect/>
+          </a:stretch>
+        </p:blipFill>
+        <p:spPr>
+          <a:xfrm>
+            <a:off x="2577263" y="5150782"/>
+            <a:ext cx="265176" cy="265176"/>
+          </a:xfrm>
+          <a:prstGeom prst="rect">
+            <a:avLst/>
+          </a:prstGeom>
+        </p:spPr>
+      </p:pic>
+      <p:pic>
+        <p:nvPicPr>
+          <p:cNvPr id="73" name="图片 72">
+            <a:extLst>
+              <a:ext uri="{FF2B5EF4-FFF2-40B4-BE49-F238E27FC236}">
+                <a16:creationId xmlns:a16="http://schemas.microsoft.com/office/drawing/2014/main" id="{AF76EC3C-D8AA-4D99-87AD-CA5FF1E550F8}"/>
+              </a:ext>
+            </a:extLst>
+          </p:cNvPr>
+          <p:cNvPicPr>
+            <a:picLocks noChangeAspect="1"/>
+          </p:cNvPicPr>
+          <p:nvPr/>
+        </p:nvPicPr>
+        <p:blipFill>
+          <a:blip r:embed="rId4">
+            <a:extLst>
+              <a:ext uri="{28A0092B-C50C-407E-A947-70E740481C1C}">
+                <a14:useLocalDpi xmlns:a14="http://schemas.microsoft.com/office/drawing/2010/main" val="0"/>
+              </a:ext>
+            </a:extLst>
+          </a:blip>
+          <a:stretch>
+            <a:fillRect/>
+          </a:stretch>
+        </p:blipFill>
+        <p:spPr>
+          <a:xfrm>
+            <a:off x="2577263" y="5463405"/>
+            <a:ext cx="265176" cy="265176"/>
+          </a:xfrm>
+          <a:prstGeom prst="rect">
+            <a:avLst/>
+          </a:prstGeom>
+        </p:spPr>
+      </p:pic>
+      <p:pic>
+        <p:nvPicPr>
+          <p:cNvPr id="74" name="图片 73">
+            <a:extLst>
+              <a:ext uri="{FF2B5EF4-FFF2-40B4-BE49-F238E27FC236}">
+                <a16:creationId xmlns:a16="http://schemas.microsoft.com/office/drawing/2014/main" id="{A2331E28-E700-4B46-B679-A33D9640F651}"/>
+              </a:ext>
+            </a:extLst>
+          </p:cNvPr>
+          <p:cNvPicPr>
+            <a:picLocks noChangeAspect="1"/>
+          </p:cNvPicPr>
+          <p:nvPr/>
+        </p:nvPicPr>
+        <p:blipFill>
+          <a:blip r:embed="rId5">
+            <a:extLst>
+              <a:ext uri="{28A0092B-C50C-407E-A947-70E740481C1C}">
+                <a14:useLocalDpi xmlns:a14="http://schemas.microsoft.com/office/drawing/2010/main" val="0"/>
+              </a:ext>
+            </a:extLst>
+          </a:blip>
+          <a:stretch>
+            <a:fillRect/>
+          </a:stretch>
+        </p:blipFill>
+        <p:spPr>
+          <a:xfrm>
+            <a:off x="2577263" y="5776028"/>
+            <a:ext cx="265176" cy="265176"/>
+          </a:xfrm>
+          <a:prstGeom prst="rect">
+            <a:avLst/>
+          </a:prstGeom>
+        </p:spPr>
+      </p:pic>
+      <p:pic>
+        <p:nvPicPr>
+          <p:cNvPr id="75" name="图片 74">
+            <a:extLst>
+              <a:ext uri="{FF2B5EF4-FFF2-40B4-BE49-F238E27FC236}">
+                <a16:creationId xmlns:a16="http://schemas.microsoft.com/office/drawing/2014/main" id="{82A27E33-9D12-4361-8A8F-2699A475CE04}"/>
+              </a:ext>
+            </a:extLst>
+          </p:cNvPr>
+          <p:cNvPicPr>
+            <a:picLocks noChangeAspect="1"/>
+          </p:cNvPicPr>
+          <p:nvPr/>
+        </p:nvPicPr>
+        <p:blipFill>
+          <a:blip r:embed="rId6">
+            <a:extLst>
+              <a:ext uri="{28A0092B-C50C-407E-A947-70E740481C1C}">
+                <a14:useLocalDpi xmlns:a14="http://schemas.microsoft.com/office/drawing/2010/main" val="0"/>
+              </a:ext>
+            </a:extLst>
+          </a:blip>
+          <a:stretch>
+            <a:fillRect/>
+          </a:stretch>
+        </p:blipFill>
+        <p:spPr>
+          <a:xfrm>
+            <a:off x="2577263" y="6088651"/>
+            <a:ext cx="265176" cy="265176"/>
+          </a:xfrm>
+          <a:prstGeom prst="rect">
+            <a:avLst/>
+          </a:prstGeom>
+        </p:spPr>
+      </p:pic>
+      <p:sp>
+        <p:nvSpPr>
+          <p:cNvPr id="77" name="文本框 76">
+            <a:extLst>
+              <a:ext uri="{FF2B5EF4-FFF2-40B4-BE49-F238E27FC236}">
+                <a16:creationId xmlns:a16="http://schemas.microsoft.com/office/drawing/2014/main" id="{DD08B0DE-CB89-4BB3-B734-59BE4C99A539}"/>
+              </a:ext>
+            </a:extLst>
+          </p:cNvPr>
+          <p:cNvSpPr txBox="1"/>
+          <p:nvPr/>
+        </p:nvSpPr>
+        <p:spPr>
+          <a:xfrm>
+            <a:off x="2834196" y="5082749"/>
+            <a:ext cx="6682953" cy="1651734"/>
+          </a:xfrm>
+          <a:prstGeom prst="rect">
+            <a:avLst/>
+          </a:prstGeom>
+          <a:noFill/>
+        </p:spPr>
+        <p:txBody>
+          <a:bodyPr wrap="square" rtlCol="0">
+            <a:spAutoFit/>
+          </a:bodyPr>
+          <a:lstStyle/>
+          <a:p>
+            <a:pPr>
+              <a:lnSpc>
+                <a:spcPts val="2500"/>
+              </a:lnSpc>
+            </a:pPr>
+            <a:r>
+              <a:rPr lang="en-US" sz="1600">
+                <a:latin typeface="Leelawadee UI" panose="020B0502040204020203" pitchFamily="34" charset="-34"/>
+                <a:ea typeface="Microsoft JhengHei Light" panose="020B0304030504040204" pitchFamily="34" charset="-120"/>
+                <a:cs typeface="Leelawadee UI" panose="020B0502040204020203" pitchFamily="34" charset="-34"/>
+              </a:rPr>
+              <a:t>INT2: </a:t>
+            </a:r>
+            <a:r>
+              <a:rPr lang="zh-CN" altLang="en-US" sz="1600">
+                <a:latin typeface="华文楷体" panose="02010600040101010101" pitchFamily="2" charset="-122"/>
+                <a:ea typeface="华文楷体" panose="02010600040101010101" pitchFamily="2" charset="-122"/>
+                <a:cs typeface="Leelawadee UI" panose="020B0502040204020203" pitchFamily="34" charset="-34"/>
+              </a:rPr>
+              <a:t>中断数字型输出</a:t>
+            </a:r>
+            <a:r>
+              <a:rPr lang="en-US" altLang="zh-CN" sz="1600">
+                <a:latin typeface="华文楷体" panose="02010600040101010101" pitchFamily="2" charset="-122"/>
+                <a:ea typeface="华文楷体" panose="02010600040101010101" pitchFamily="2" charset="-122"/>
+                <a:cs typeface="Leelawadee UI" panose="020B0502040204020203" pitchFamily="34" charset="-34"/>
+              </a:rPr>
+              <a:t>(</a:t>
+            </a:r>
+            <a:r>
+              <a:rPr lang="zh-CN" altLang="en-US" sz="1600">
+                <a:latin typeface="华文楷体" panose="02010600040101010101" pitchFamily="2" charset="-122"/>
+                <a:ea typeface="华文楷体" panose="02010600040101010101" pitchFamily="2" charset="-122"/>
+                <a:cs typeface="Leelawadee UI" panose="020B0502040204020203" pitchFamily="34" charset="-34"/>
+              </a:rPr>
+              <a:t>推挽输出或漏极开路</a:t>
+            </a:r>
+            <a:r>
+              <a:rPr lang="en-US" altLang="zh-CN" sz="1600">
+                <a:latin typeface="华文楷体" panose="02010600040101010101" pitchFamily="2" charset="-122"/>
+                <a:ea typeface="华文楷体" panose="02010600040101010101" pitchFamily="2" charset="-122"/>
+                <a:cs typeface="Leelawadee UI" panose="020B0502040204020203" pitchFamily="34" charset="-34"/>
+              </a:rPr>
+              <a:t>)</a:t>
+            </a:r>
+            <a:endParaRPr lang="en-US" sz="1600">
+              <a:latin typeface="华文楷体" panose="02010600040101010101" pitchFamily="2" charset="-122"/>
+              <a:ea typeface="华文楷体" panose="02010600040101010101" pitchFamily="2" charset="-122"/>
+              <a:cs typeface="Leelawadee UI" panose="020B0502040204020203" pitchFamily="34" charset="-34"/>
+            </a:endParaRPr>
+          </a:p>
+          <a:p>
+            <a:pPr>
+              <a:lnSpc>
+                <a:spcPts val="2500"/>
+              </a:lnSpc>
+            </a:pPr>
+            <a:r>
+              <a:rPr lang="en-US" sz="1600">
+                <a:latin typeface="Leelawadee UI" panose="020B0502040204020203" pitchFamily="34" charset="-34"/>
+                <a:ea typeface="Microsoft JhengHei Light" panose="020B0304030504040204" pitchFamily="34" charset="-120"/>
+                <a:cs typeface="Leelawadee UI" panose="020B0502040204020203" pitchFamily="34" charset="-34"/>
+              </a:rPr>
+              <a:t>INT1: </a:t>
+            </a:r>
+            <a:r>
+              <a:rPr lang="zh-CN" altLang="en-US" sz="1600">
+                <a:latin typeface="华文楷体" panose="02010600040101010101" pitchFamily="2" charset="-122"/>
+                <a:ea typeface="华文楷体" panose="02010600040101010101" pitchFamily="2" charset="-122"/>
+                <a:cs typeface="Leelawadee UI" panose="020B0502040204020203" pitchFamily="34" charset="-34"/>
+              </a:rPr>
+              <a:t>中断数字型输出</a:t>
+            </a:r>
+            <a:r>
+              <a:rPr lang="en-US" altLang="zh-CN" sz="1600">
+                <a:latin typeface="华文楷体" panose="02010600040101010101" pitchFamily="2" charset="-122"/>
+                <a:ea typeface="华文楷体" panose="02010600040101010101" pitchFamily="2" charset="-122"/>
+                <a:cs typeface="Leelawadee UI" panose="020B0502040204020203" pitchFamily="34" charset="-34"/>
+              </a:rPr>
+              <a:t> (</a:t>
+            </a:r>
+            <a:r>
+              <a:rPr lang="zh-CN" altLang="en-US" sz="1600">
+                <a:latin typeface="华文楷体" panose="02010600040101010101" pitchFamily="2" charset="-122"/>
+                <a:ea typeface="华文楷体" panose="02010600040101010101" pitchFamily="2" charset="-122"/>
+                <a:cs typeface="Leelawadee UI" panose="020B0502040204020203" pitchFamily="34" charset="-34"/>
+              </a:rPr>
+              <a:t>推挽输出或漏极开路</a:t>
+            </a:r>
+            <a:r>
+              <a:rPr lang="en-US" altLang="zh-CN" sz="1600">
+                <a:latin typeface="华文楷体" panose="02010600040101010101" pitchFamily="2" charset="-122"/>
+                <a:ea typeface="华文楷体" panose="02010600040101010101" pitchFamily="2" charset="-122"/>
+                <a:cs typeface="Leelawadee UI" panose="020B0502040204020203" pitchFamily="34" charset="-34"/>
+              </a:rPr>
+              <a:t>)</a:t>
+            </a:r>
+            <a:endParaRPr lang="en-US" sz="1600">
+              <a:latin typeface="华文楷体" panose="02010600040101010101" pitchFamily="2" charset="-122"/>
+              <a:ea typeface="华文楷体" panose="02010600040101010101" pitchFamily="2" charset="-122"/>
+              <a:cs typeface="Leelawadee UI" panose="020B0502040204020203" pitchFamily="34" charset="-34"/>
+            </a:endParaRPr>
+          </a:p>
+          <a:p>
+            <a:pPr>
+              <a:lnSpc>
+                <a:spcPts val="2500"/>
+              </a:lnSpc>
+            </a:pPr>
+            <a:r>
+              <a:rPr lang="en-US" sz="1600">
+                <a:latin typeface="Leelawadee UI" panose="020B0502040204020203" pitchFamily="34" charset="-34"/>
+                <a:ea typeface="Microsoft JhengHei Light" panose="020B0304030504040204" pitchFamily="34" charset="-120"/>
+                <a:cs typeface="Leelawadee UI" panose="020B0502040204020203" pitchFamily="34" charset="-34"/>
+              </a:rPr>
+              <a:t>FSYNC: </a:t>
+            </a:r>
+            <a:r>
+              <a:rPr lang="zh-CN" altLang="en-US" sz="1600">
+                <a:latin typeface="华文楷体" panose="02010600040101010101" pitchFamily="2" charset="-122"/>
+                <a:ea typeface="华文楷体" panose="02010600040101010101" pitchFamily="2" charset="-122"/>
+                <a:cs typeface="Leelawadee UI" panose="020B0502040204020203" pitchFamily="34" charset="-34"/>
+              </a:rPr>
+              <a:t>帧同步数字输入或不连接</a:t>
+            </a:r>
+            <a:endParaRPr lang="en-US" altLang="zh-CN" sz="1600">
+              <a:latin typeface="华文楷体" panose="02010600040101010101" pitchFamily="2" charset="-122"/>
+              <a:ea typeface="华文楷体" panose="02010600040101010101" pitchFamily="2" charset="-122"/>
+              <a:cs typeface="Leelawadee UI" panose="020B0502040204020203" pitchFamily="34" charset="-34"/>
+            </a:endParaRPr>
+          </a:p>
+          <a:p>
+            <a:pPr>
+              <a:lnSpc>
+                <a:spcPts val="2500"/>
+              </a:lnSpc>
+            </a:pPr>
+            <a:r>
+              <a:rPr lang="en-US" sz="1600">
+                <a:latin typeface="Leelawadee UI" panose="020B0502040204020203" pitchFamily="34" charset="-34"/>
+                <a:ea typeface="Microsoft JhengHei Light" panose="020B0304030504040204" pitchFamily="34" charset="-120"/>
+                <a:cs typeface="Leelawadee UI" panose="020B0502040204020203" pitchFamily="34" charset="-34"/>
+              </a:rPr>
+              <a:t>VCC_1.8V: </a:t>
+            </a:r>
+            <a:r>
+              <a:rPr lang="zh-CN" altLang="en-US" sz="1600">
+                <a:latin typeface="华文楷体" panose="02010600040101010101" pitchFamily="2" charset="-122"/>
+                <a:ea typeface="华文楷体" panose="02010600040101010101" pitchFamily="2" charset="-122"/>
+                <a:cs typeface="Leelawadee UI" panose="020B0502040204020203" pitchFamily="34" charset="-34"/>
+              </a:rPr>
+              <a:t>为</a:t>
+            </a:r>
+            <a:r>
+              <a:rPr lang="en-US" sz="1600">
+                <a:latin typeface="Leelawadee UI" panose="020B0502040204020203" pitchFamily="34" charset="-34"/>
+                <a:ea typeface="Microsoft JhengHei Light" panose="020B0304030504040204" pitchFamily="34" charset="-120"/>
+                <a:cs typeface="Leelawadee UI" panose="020B0502040204020203" pitchFamily="34" charset="-34"/>
+              </a:rPr>
+              <a:t> ICM20600 </a:t>
+            </a:r>
+            <a:r>
+              <a:rPr lang="zh-CN" altLang="en-US" sz="1600">
+                <a:latin typeface="华文楷体" panose="02010600040101010101" pitchFamily="2" charset="-122"/>
+                <a:ea typeface="华文楷体" panose="02010600040101010101" pitchFamily="2" charset="-122"/>
+                <a:cs typeface="Leelawadee UI" panose="020B0502040204020203" pitchFamily="34" charset="-34"/>
+              </a:rPr>
+              <a:t>和</a:t>
+            </a:r>
+            <a:r>
+              <a:rPr lang="en-US" sz="1600">
+                <a:latin typeface="Leelawadee UI" panose="020B0502040204020203" pitchFamily="34" charset="-34"/>
+                <a:ea typeface="Microsoft JhengHei Light" panose="020B0304030504040204" pitchFamily="34" charset="-120"/>
+                <a:cs typeface="Leelawadee UI" panose="020B0502040204020203" pitchFamily="34" charset="-34"/>
+              </a:rPr>
+              <a:t> AK09918 </a:t>
+            </a:r>
+            <a:r>
+              <a:rPr lang="zh-CN" altLang="en-US" sz="1600">
+                <a:latin typeface="华文楷体" panose="02010600040101010101" pitchFamily="2" charset="-122"/>
+                <a:ea typeface="华文楷体" panose="02010600040101010101" pitchFamily="2" charset="-122"/>
+                <a:cs typeface="Leelawadee UI" panose="020B0502040204020203" pitchFamily="34" charset="-34"/>
+              </a:rPr>
+              <a:t>提供</a:t>
+            </a:r>
+            <a:r>
+              <a:rPr lang="zh-CN" altLang="en-US" sz="1600">
+                <a:latin typeface="Leelawadee UI" panose="020B0502040204020203" pitchFamily="34" charset="-34"/>
+                <a:ea typeface="Microsoft JhengHei Light" panose="020B0304030504040204" pitchFamily="34" charset="-120"/>
+                <a:cs typeface="Leelawadee UI" panose="020B0502040204020203" pitchFamily="34" charset="-34"/>
+              </a:rPr>
+              <a:t> </a:t>
+            </a:r>
+            <a:r>
+              <a:rPr lang="en-US" altLang="zh-CN" sz="1600">
+                <a:latin typeface="Leelawadee UI" panose="020B0502040204020203" pitchFamily="34" charset="-34"/>
+                <a:ea typeface="Microsoft JhengHei Light" panose="020B0304030504040204" pitchFamily="34" charset="-120"/>
+                <a:cs typeface="Leelawadee UI" panose="020B0502040204020203" pitchFamily="34" charset="-34"/>
+              </a:rPr>
+              <a:t>1.8V </a:t>
+            </a:r>
+            <a:r>
+              <a:rPr lang="zh-CN" altLang="en-US" sz="1600">
+                <a:latin typeface="华文楷体" panose="02010600040101010101" pitchFamily="2" charset="-122"/>
+                <a:ea typeface="华文楷体" panose="02010600040101010101" pitchFamily="2" charset="-122"/>
+                <a:cs typeface="Leelawadee UI" panose="020B0502040204020203" pitchFamily="34" charset="-34"/>
+              </a:rPr>
+              <a:t>电压</a:t>
+            </a:r>
+            <a:endParaRPr lang="en-US" sz="1600">
+              <a:latin typeface="华文楷体" panose="02010600040101010101" pitchFamily="2" charset="-122"/>
+              <a:ea typeface="华文楷体" panose="02010600040101010101" pitchFamily="2" charset="-122"/>
+              <a:cs typeface="Leelawadee UI" panose="020B0502040204020203" pitchFamily="34" charset="-34"/>
+            </a:endParaRPr>
+          </a:p>
+          <a:p>
+            <a:endParaRPr lang="en-US"/>
+          </a:p>
+        </p:txBody>
+      </p:sp>
+    </p:spTree>
+    <p:extLst>
+      <p:ext uri="{BB962C8B-B14F-4D97-AF65-F5344CB8AC3E}">
+        <p14:creationId xmlns:p14="http://schemas.microsoft.com/office/powerpoint/2010/main" val="878872686"/>
+      </p:ext>
+    </p:extLst>
+  </p:cSld>
+  <p:clrMapOvr>
+    <a:masterClrMapping/>
+  </p:clrMapOvr>
+</p:sld>
+</file>
+
 <file path=ppt/theme/theme1.xml><?xml version="1.0" encoding="utf-8"?>
 <a:theme xmlns:a="http://schemas.openxmlformats.org/drawingml/2006/main" name="Office 主题​​">
   <a:themeElements>

</xml_diff>